<commit_message>
Adding Part of Day 17 Code Examples prior to lecture, and updating Day 17 Powerpoint
</commit_message>
<xml_diff>
--- a/powerpoints/Day_17.pptx
+++ b/powerpoints/Day_17.pptx
@@ -5,22 +5,26 @@
     <p:sldMasterId id="2147483690" r:id="rId1"/>
   </p:sldMasterIdLst>
   <p:notesMasterIdLst>
-    <p:notesMasterId r:id="rId15"/>
+    <p:notesMasterId r:id="rId19"/>
   </p:notesMasterIdLst>
   <p:sldIdLst>
     <p:sldId id="256" r:id="rId2"/>
-    <p:sldId id="257" r:id="rId3"/>
-    <p:sldId id="277" r:id="rId4"/>
-    <p:sldId id="258" r:id="rId5"/>
+    <p:sldId id="277" r:id="rId3"/>
+    <p:sldId id="290" r:id="rId4"/>
+    <p:sldId id="289" r:id="rId5"/>
     <p:sldId id="259" r:id="rId6"/>
-    <p:sldId id="260" r:id="rId7"/>
-    <p:sldId id="261" r:id="rId8"/>
+    <p:sldId id="258" r:id="rId7"/>
+    <p:sldId id="260" r:id="rId8"/>
     <p:sldId id="262" r:id="rId9"/>
     <p:sldId id="278" r:id="rId10"/>
-    <p:sldId id="263" r:id="rId11"/>
-    <p:sldId id="264" r:id="rId12"/>
-    <p:sldId id="265" r:id="rId13"/>
-    <p:sldId id="266" r:id="rId14"/>
+    <p:sldId id="283" r:id="rId11"/>
+    <p:sldId id="263" r:id="rId12"/>
+    <p:sldId id="264" r:id="rId13"/>
+    <p:sldId id="265" r:id="rId14"/>
+    <p:sldId id="266" r:id="rId15"/>
+    <p:sldId id="261" r:id="rId16"/>
+    <p:sldId id="284" r:id="rId17"/>
+    <p:sldId id="286" r:id="rId18"/>
   </p:sldIdLst>
   <p:sldSz cx="9144000" cy="6858000" type="screen4x3"/>
   <p:notesSz cx="7010400" cy="9296400"/>
@@ -314,7 +318,7 @@
           <a:p>
             <a:fld id="{62459D49-2462-4D50-92E9-CD4C9D2EDD85}" type="datetimeFigureOut">
               <a:rPr lang="en-US" smtClean="0"/>
-              <a:t>9/15/2021</a:t>
+              <a:t>10/6/2021</a:t>
             </a:fld>
             <a:endParaRPr lang="en-US"/>
           </a:p>
@@ -586,7 +590,7 @@
   <p:cSld>
     <p:spTree>
       <p:nvGrpSpPr>
-        <p:cNvPr id="1" name="Shape 214"/>
+        <p:cNvPr id="1" name="Shape 221"/>
         <p:cNvGrpSpPr/>
         <p:nvPr/>
       </p:nvGrpSpPr>
@@ -600,7 +604,7 @@
       </p:grpSpPr>
       <p:sp>
         <p:nvSpPr>
-          <p:cNvPr id="215" name="Google Shape;215;p2:notes"/>
+          <p:cNvPr id="222" name="Google Shape;222;p3:notes"/>
           <p:cNvSpPr txBox="1">
             <a:spLocks noGrp="1"/>
           </p:cNvSpPr>
@@ -638,7 +642,7 @@
       </p:sp>
       <p:sp>
         <p:nvSpPr>
-          <p:cNvPr id="216" name="Google Shape;216;p2:notes"/>
+          <p:cNvPr id="223" name="Google Shape;223;p3:notes"/>
           <p:cNvSpPr>
             <a:spLocks noGrp="1" noRot="1" noChangeAspect="1"/>
           </p:cNvSpPr>
@@ -789,7 +793,433 @@
 </p:notes>
 </file>
 
+<file path=ppt/notesSlides/notesSlide11.xml><?xml version="1.0" encoding="utf-8"?>
+<p:notes xmlns:a="http://schemas.openxmlformats.org/drawingml/2006/main" xmlns:r="http://schemas.openxmlformats.org/officeDocument/2006/relationships" xmlns:p="http://schemas.openxmlformats.org/presentationml/2006/main" showMasterSp="0" showMasterPhAnim="0">
+  <p:cSld>
+    <p:spTree>
+      <p:nvGrpSpPr>
+        <p:cNvPr id="1" name="Shape 242"/>
+        <p:cNvGrpSpPr/>
+        <p:nvPr/>
+      </p:nvGrpSpPr>
+      <p:grpSpPr>
+        <a:xfrm>
+          <a:off x="0" y="0"/>
+          <a:ext cx="0" cy="0"/>
+          <a:chOff x="0" y="0"/>
+          <a:chExt cx="0" cy="0"/>
+        </a:xfrm>
+      </p:grpSpPr>
+      <p:sp>
+        <p:nvSpPr>
+          <p:cNvPr id="243" name="Google Shape;243;p6:notes"/>
+          <p:cNvSpPr txBox="1">
+            <a:spLocks noGrp="1"/>
+          </p:cNvSpPr>
+          <p:nvPr>
+            <p:ph type="body" idx="1"/>
+          </p:nvPr>
+        </p:nvSpPr>
+        <p:spPr>
+          <a:xfrm>
+            <a:off x="701040" y="4415790"/>
+            <a:ext cx="5608320" cy="4183380"/>
+          </a:xfrm>
+          <a:prstGeom prst="rect">
+            <a:avLst/>
+          </a:prstGeom>
+        </p:spPr>
+        <p:txBody>
+          <a:bodyPr spcFirstLastPara="1" wrap="square" lIns="93150" tIns="46575" rIns="93150" bIns="46575" anchor="t" anchorCtr="0">
+            <a:noAutofit/>
+          </a:bodyPr>
+          <a:lstStyle/>
+          <a:p>
+            <a:pPr marL="0" lvl="0" indent="0" algn="l" rtl="0">
+              <a:spcBef>
+                <a:spcPts val="0"/>
+              </a:spcBef>
+              <a:spcAft>
+                <a:spcPts val="0"/>
+              </a:spcAft>
+              <a:buNone/>
+            </a:pPr>
+            <a:endParaRPr/>
+          </a:p>
+        </p:txBody>
+      </p:sp>
+      <p:sp>
+        <p:nvSpPr>
+          <p:cNvPr id="244" name="Google Shape;244;p6:notes"/>
+          <p:cNvSpPr>
+            <a:spLocks noGrp="1" noRot="1" noChangeAspect="1"/>
+          </p:cNvSpPr>
+          <p:nvPr>
+            <p:ph type="sldImg" idx="2"/>
+          </p:nvPr>
+        </p:nvSpPr>
+        <p:spPr>
+          <a:xfrm>
+            <a:off x="1181100" y="696913"/>
+            <a:ext cx="4648200" cy="3486150"/>
+          </a:xfrm>
+          <a:custGeom>
+            <a:avLst/>
+            <a:gdLst/>
+            <a:ahLst/>
+            <a:cxnLst/>
+            <a:rect l="l" t="t" r="r" b="b"/>
+            <a:pathLst>
+              <a:path w="120000" h="120000" extrusionOk="0">
+                <a:moveTo>
+                  <a:pt x="0" y="0"/>
+                </a:moveTo>
+                <a:lnTo>
+                  <a:pt x="120000" y="0"/>
+                </a:lnTo>
+                <a:lnTo>
+                  <a:pt x="120000" y="120000"/>
+                </a:lnTo>
+                <a:lnTo>
+                  <a:pt x="0" y="120000"/>
+                </a:lnTo>
+                <a:close/>
+              </a:path>
+            </a:pathLst>
+          </a:custGeom>
+        </p:spPr>
+      </p:sp>
+    </p:spTree>
+  </p:cSld>
+  <p:clrMapOvr>
+    <a:masterClrMapping/>
+  </p:clrMapOvr>
+</p:notes>
+</file>
+
+<file path=ppt/notesSlides/notesSlide12.xml><?xml version="1.0" encoding="utf-8"?>
+<p:notes xmlns:a="http://schemas.openxmlformats.org/drawingml/2006/main" xmlns:r="http://schemas.openxmlformats.org/officeDocument/2006/relationships" xmlns:p="http://schemas.openxmlformats.org/presentationml/2006/main" showMasterSp="0" showMasterPhAnim="0">
+  <p:cSld>
+    <p:spTree>
+      <p:nvGrpSpPr>
+        <p:cNvPr id="1" name="Shape 242"/>
+        <p:cNvGrpSpPr/>
+        <p:nvPr/>
+      </p:nvGrpSpPr>
+      <p:grpSpPr>
+        <a:xfrm>
+          <a:off x="0" y="0"/>
+          <a:ext cx="0" cy="0"/>
+          <a:chOff x="0" y="0"/>
+          <a:chExt cx="0" cy="0"/>
+        </a:xfrm>
+      </p:grpSpPr>
+      <p:sp>
+        <p:nvSpPr>
+          <p:cNvPr id="243" name="Google Shape;243;p6:notes"/>
+          <p:cNvSpPr txBox="1">
+            <a:spLocks noGrp="1"/>
+          </p:cNvSpPr>
+          <p:nvPr>
+            <p:ph type="body" idx="1"/>
+          </p:nvPr>
+        </p:nvSpPr>
+        <p:spPr>
+          <a:xfrm>
+            <a:off x="701040" y="4415790"/>
+            <a:ext cx="5608320" cy="4183380"/>
+          </a:xfrm>
+          <a:prstGeom prst="rect">
+            <a:avLst/>
+          </a:prstGeom>
+        </p:spPr>
+        <p:txBody>
+          <a:bodyPr spcFirstLastPara="1" wrap="square" lIns="93150" tIns="46575" rIns="93150" bIns="46575" anchor="t" anchorCtr="0">
+            <a:noAutofit/>
+          </a:bodyPr>
+          <a:lstStyle/>
+          <a:p>
+            <a:pPr marL="0" lvl="0" indent="0" algn="l" rtl="0">
+              <a:spcBef>
+                <a:spcPts val="0"/>
+              </a:spcBef>
+              <a:spcAft>
+                <a:spcPts val="0"/>
+              </a:spcAft>
+              <a:buNone/>
+            </a:pPr>
+            <a:endParaRPr/>
+          </a:p>
+        </p:txBody>
+      </p:sp>
+      <p:sp>
+        <p:nvSpPr>
+          <p:cNvPr id="244" name="Google Shape;244;p6:notes"/>
+          <p:cNvSpPr>
+            <a:spLocks noGrp="1" noRot="1" noChangeAspect="1"/>
+          </p:cNvSpPr>
+          <p:nvPr>
+            <p:ph type="sldImg" idx="2"/>
+          </p:nvPr>
+        </p:nvSpPr>
+        <p:spPr>
+          <a:xfrm>
+            <a:off x="1181100" y="696913"/>
+            <a:ext cx="4648200" cy="3486150"/>
+          </a:xfrm>
+          <a:custGeom>
+            <a:avLst/>
+            <a:gdLst/>
+            <a:ahLst/>
+            <a:cxnLst/>
+            <a:rect l="l" t="t" r="r" b="b"/>
+            <a:pathLst>
+              <a:path w="120000" h="120000" extrusionOk="0">
+                <a:moveTo>
+                  <a:pt x="0" y="0"/>
+                </a:moveTo>
+                <a:lnTo>
+                  <a:pt x="120000" y="0"/>
+                </a:lnTo>
+                <a:lnTo>
+                  <a:pt x="120000" y="120000"/>
+                </a:lnTo>
+                <a:lnTo>
+                  <a:pt x="0" y="120000"/>
+                </a:lnTo>
+                <a:close/>
+              </a:path>
+            </a:pathLst>
+          </a:custGeom>
+        </p:spPr>
+      </p:sp>
+    </p:spTree>
+    <p:extLst>
+      <p:ext uri="{BB962C8B-B14F-4D97-AF65-F5344CB8AC3E}">
+        <p14:creationId xmlns:p14="http://schemas.microsoft.com/office/powerpoint/2010/main" val="3692088734"/>
+      </p:ext>
+    </p:extLst>
+  </p:cSld>
+  <p:clrMapOvr>
+    <a:masterClrMapping/>
+  </p:clrMapOvr>
+</p:notes>
+</file>
+
+<file path=ppt/notesSlides/notesSlide13.xml><?xml version="1.0" encoding="utf-8"?>
+<p:notes xmlns:a="http://schemas.openxmlformats.org/drawingml/2006/main" xmlns:r="http://schemas.openxmlformats.org/officeDocument/2006/relationships" xmlns:p="http://schemas.openxmlformats.org/presentationml/2006/main" showMasterSp="0" showMasterPhAnim="0">
+  <p:cSld>
+    <p:spTree>
+      <p:nvGrpSpPr>
+        <p:cNvPr id="1" name="Shape 242"/>
+        <p:cNvGrpSpPr/>
+        <p:nvPr/>
+      </p:nvGrpSpPr>
+      <p:grpSpPr>
+        <a:xfrm>
+          <a:off x="0" y="0"/>
+          <a:ext cx="0" cy="0"/>
+          <a:chOff x="0" y="0"/>
+          <a:chExt cx="0" cy="0"/>
+        </a:xfrm>
+      </p:grpSpPr>
+      <p:sp>
+        <p:nvSpPr>
+          <p:cNvPr id="243" name="Google Shape;243;p6:notes"/>
+          <p:cNvSpPr txBox="1">
+            <a:spLocks noGrp="1"/>
+          </p:cNvSpPr>
+          <p:nvPr>
+            <p:ph type="body" idx="1"/>
+          </p:nvPr>
+        </p:nvSpPr>
+        <p:spPr>
+          <a:xfrm>
+            <a:off x="701040" y="4415790"/>
+            <a:ext cx="5608320" cy="4183380"/>
+          </a:xfrm>
+          <a:prstGeom prst="rect">
+            <a:avLst/>
+          </a:prstGeom>
+        </p:spPr>
+        <p:txBody>
+          <a:bodyPr spcFirstLastPara="1" wrap="square" lIns="93150" tIns="46575" rIns="93150" bIns="46575" anchor="t" anchorCtr="0">
+            <a:noAutofit/>
+          </a:bodyPr>
+          <a:lstStyle/>
+          <a:p>
+            <a:pPr marL="0" lvl="0" indent="0" algn="l" rtl="0">
+              <a:spcBef>
+                <a:spcPts val="0"/>
+              </a:spcBef>
+              <a:spcAft>
+                <a:spcPts val="0"/>
+              </a:spcAft>
+              <a:buNone/>
+            </a:pPr>
+            <a:endParaRPr/>
+          </a:p>
+        </p:txBody>
+      </p:sp>
+      <p:sp>
+        <p:nvSpPr>
+          <p:cNvPr id="244" name="Google Shape;244;p6:notes"/>
+          <p:cNvSpPr>
+            <a:spLocks noGrp="1" noRot="1" noChangeAspect="1"/>
+          </p:cNvSpPr>
+          <p:nvPr>
+            <p:ph type="sldImg" idx="2"/>
+          </p:nvPr>
+        </p:nvSpPr>
+        <p:spPr>
+          <a:xfrm>
+            <a:off x="1181100" y="696913"/>
+            <a:ext cx="4648200" cy="3486150"/>
+          </a:xfrm>
+          <a:custGeom>
+            <a:avLst/>
+            <a:gdLst/>
+            <a:ahLst/>
+            <a:cxnLst/>
+            <a:rect l="l" t="t" r="r" b="b"/>
+            <a:pathLst>
+              <a:path w="120000" h="120000" extrusionOk="0">
+                <a:moveTo>
+                  <a:pt x="0" y="0"/>
+                </a:moveTo>
+                <a:lnTo>
+                  <a:pt x="120000" y="0"/>
+                </a:lnTo>
+                <a:lnTo>
+                  <a:pt x="120000" y="120000"/>
+                </a:lnTo>
+                <a:lnTo>
+                  <a:pt x="0" y="120000"/>
+                </a:lnTo>
+                <a:close/>
+              </a:path>
+            </a:pathLst>
+          </a:custGeom>
+        </p:spPr>
+      </p:sp>
+    </p:spTree>
+    <p:extLst>
+      <p:ext uri="{BB962C8B-B14F-4D97-AF65-F5344CB8AC3E}">
+        <p14:creationId xmlns:p14="http://schemas.microsoft.com/office/powerpoint/2010/main" val="3309130150"/>
+      </p:ext>
+    </p:extLst>
+  </p:cSld>
+  <p:clrMapOvr>
+    <a:masterClrMapping/>
+  </p:clrMapOvr>
+</p:notes>
+</file>
+
 <file path=ppt/notesSlides/notesSlide2.xml><?xml version="1.0" encoding="utf-8"?>
+<p:notes xmlns:a="http://schemas.openxmlformats.org/drawingml/2006/main" xmlns:r="http://schemas.openxmlformats.org/officeDocument/2006/relationships" xmlns:p="http://schemas.openxmlformats.org/presentationml/2006/main" showMasterSp="0" showMasterPhAnim="0">
+  <p:cSld>
+    <p:spTree>
+      <p:nvGrpSpPr>
+        <p:cNvPr id="1" name="Shape 228"/>
+        <p:cNvGrpSpPr/>
+        <p:nvPr/>
+      </p:nvGrpSpPr>
+      <p:grpSpPr>
+        <a:xfrm>
+          <a:off x="0" y="0"/>
+          <a:ext cx="0" cy="0"/>
+          <a:chOff x="0" y="0"/>
+          <a:chExt cx="0" cy="0"/>
+        </a:xfrm>
+      </p:grpSpPr>
+      <p:sp>
+        <p:nvSpPr>
+          <p:cNvPr id="229" name="Google Shape;229;p4:notes"/>
+          <p:cNvSpPr txBox="1">
+            <a:spLocks noGrp="1"/>
+          </p:cNvSpPr>
+          <p:nvPr>
+            <p:ph type="body" idx="1"/>
+          </p:nvPr>
+        </p:nvSpPr>
+        <p:spPr>
+          <a:xfrm>
+            <a:off x="701040" y="4415790"/>
+            <a:ext cx="5608320" cy="4183380"/>
+          </a:xfrm>
+          <a:prstGeom prst="rect">
+            <a:avLst/>
+          </a:prstGeom>
+        </p:spPr>
+        <p:txBody>
+          <a:bodyPr spcFirstLastPara="1" wrap="square" lIns="93150" tIns="46575" rIns="93150" bIns="46575" anchor="t" anchorCtr="0">
+            <a:noAutofit/>
+          </a:bodyPr>
+          <a:lstStyle/>
+          <a:p>
+            <a:pPr marL="0" lvl="0" indent="0" algn="l" rtl="0">
+              <a:spcBef>
+                <a:spcPts val="0"/>
+              </a:spcBef>
+              <a:spcAft>
+                <a:spcPts val="0"/>
+              </a:spcAft>
+              <a:buNone/>
+            </a:pPr>
+            <a:endParaRPr/>
+          </a:p>
+        </p:txBody>
+      </p:sp>
+      <p:sp>
+        <p:nvSpPr>
+          <p:cNvPr id="230" name="Google Shape;230;p4:notes"/>
+          <p:cNvSpPr>
+            <a:spLocks noGrp="1" noRot="1" noChangeAspect="1"/>
+          </p:cNvSpPr>
+          <p:nvPr>
+            <p:ph type="sldImg" idx="2"/>
+          </p:nvPr>
+        </p:nvSpPr>
+        <p:spPr>
+          <a:xfrm>
+            <a:off x="1181100" y="696913"/>
+            <a:ext cx="4648200" cy="3486150"/>
+          </a:xfrm>
+          <a:custGeom>
+            <a:avLst/>
+            <a:gdLst/>
+            <a:ahLst/>
+            <a:cxnLst/>
+            <a:rect l="l" t="t" r="r" b="b"/>
+            <a:pathLst>
+              <a:path w="120000" h="120000" extrusionOk="0">
+                <a:moveTo>
+                  <a:pt x="0" y="0"/>
+                </a:moveTo>
+                <a:lnTo>
+                  <a:pt x="120000" y="0"/>
+                </a:lnTo>
+                <a:lnTo>
+                  <a:pt x="120000" y="120000"/>
+                </a:lnTo>
+                <a:lnTo>
+                  <a:pt x="0" y="120000"/>
+                </a:lnTo>
+                <a:close/>
+              </a:path>
+            </a:pathLst>
+          </a:custGeom>
+        </p:spPr>
+      </p:sp>
+    </p:spTree>
+  </p:cSld>
+  <p:clrMapOvr>
+    <a:masterClrMapping/>
+  </p:clrMapOvr>
+</p:notes>
+</file>
+
+<file path=ppt/notesSlides/notesSlide3.xml><?xml version="1.0" encoding="utf-8"?>
 <p:notes xmlns:a="http://schemas.openxmlformats.org/drawingml/2006/main" xmlns:r="http://schemas.openxmlformats.org/officeDocument/2006/relationships" xmlns:p="http://schemas.openxmlformats.org/presentationml/2006/main" showMasterSp="0" showMasterPhAnim="0">
   <p:cSld>
     <p:spTree>
@@ -847,110 +1277,6 @@
       <p:sp>
         <p:nvSpPr>
           <p:cNvPr id="223" name="Google Shape;223;p3:notes"/>
-          <p:cNvSpPr>
-            <a:spLocks noGrp="1" noRot="1" noChangeAspect="1"/>
-          </p:cNvSpPr>
-          <p:nvPr>
-            <p:ph type="sldImg" idx="2"/>
-          </p:nvPr>
-        </p:nvSpPr>
-        <p:spPr>
-          <a:xfrm>
-            <a:off x="1181100" y="696913"/>
-            <a:ext cx="4648200" cy="3486150"/>
-          </a:xfrm>
-          <a:custGeom>
-            <a:avLst/>
-            <a:gdLst/>
-            <a:ahLst/>
-            <a:cxnLst/>
-            <a:rect l="l" t="t" r="r" b="b"/>
-            <a:pathLst>
-              <a:path w="120000" h="120000" extrusionOk="0">
-                <a:moveTo>
-                  <a:pt x="0" y="0"/>
-                </a:moveTo>
-                <a:lnTo>
-                  <a:pt x="120000" y="0"/>
-                </a:lnTo>
-                <a:lnTo>
-                  <a:pt x="120000" y="120000"/>
-                </a:lnTo>
-                <a:lnTo>
-                  <a:pt x="0" y="120000"/>
-                </a:lnTo>
-                <a:close/>
-              </a:path>
-            </a:pathLst>
-          </a:custGeom>
-        </p:spPr>
-      </p:sp>
-    </p:spTree>
-  </p:cSld>
-  <p:clrMapOvr>
-    <a:masterClrMapping/>
-  </p:clrMapOvr>
-</p:notes>
-</file>
-
-<file path=ppt/notesSlides/notesSlide3.xml><?xml version="1.0" encoding="utf-8"?>
-<p:notes xmlns:a="http://schemas.openxmlformats.org/drawingml/2006/main" xmlns:r="http://schemas.openxmlformats.org/officeDocument/2006/relationships" xmlns:p="http://schemas.openxmlformats.org/presentationml/2006/main" showMasterSp="0" showMasterPhAnim="0">
-  <p:cSld>
-    <p:spTree>
-      <p:nvGrpSpPr>
-        <p:cNvPr id="1" name="Shape 228"/>
-        <p:cNvGrpSpPr/>
-        <p:nvPr/>
-      </p:nvGrpSpPr>
-      <p:grpSpPr>
-        <a:xfrm>
-          <a:off x="0" y="0"/>
-          <a:ext cx="0" cy="0"/>
-          <a:chOff x="0" y="0"/>
-          <a:chExt cx="0" cy="0"/>
-        </a:xfrm>
-      </p:grpSpPr>
-      <p:sp>
-        <p:nvSpPr>
-          <p:cNvPr id="229" name="Google Shape;229;p4:notes"/>
-          <p:cNvSpPr txBox="1">
-            <a:spLocks noGrp="1"/>
-          </p:cNvSpPr>
-          <p:nvPr>
-            <p:ph type="body" idx="1"/>
-          </p:nvPr>
-        </p:nvSpPr>
-        <p:spPr>
-          <a:xfrm>
-            <a:off x="701040" y="4415790"/>
-            <a:ext cx="5608320" cy="4183380"/>
-          </a:xfrm>
-          <a:prstGeom prst="rect">
-            <a:avLst/>
-          </a:prstGeom>
-        </p:spPr>
-        <p:txBody>
-          <a:bodyPr spcFirstLastPara="1" wrap="square" lIns="93150" tIns="46575" rIns="93150" bIns="46575" anchor="t" anchorCtr="0">
-            <a:noAutofit/>
-          </a:bodyPr>
-          <a:lstStyle/>
-          <a:p>
-            <a:pPr marL="0" lvl="0" indent="0" algn="l" rtl="0">
-              <a:spcBef>
-                <a:spcPts val="0"/>
-              </a:spcBef>
-              <a:spcAft>
-                <a:spcPts val="0"/>
-              </a:spcAft>
-              <a:buNone/>
-            </a:pPr>
-            <a:endParaRPr/>
-          </a:p>
-        </p:txBody>
-      </p:sp>
-      <p:sp>
-        <p:nvSpPr>
-          <p:cNvPr id="230" name="Google Shape;230;p4:notes"/>
           <p:cNvSpPr>
             <a:spLocks noGrp="1" noRot="1" noChangeAspect="1"/>
           </p:cNvSpPr>
@@ -1106,7 +1432,7 @@
   <p:cSld>
     <p:spTree>
       <p:nvGrpSpPr>
-        <p:cNvPr id="1" name="Shape 242"/>
+        <p:cNvPr id="1" name="Shape 249"/>
         <p:cNvGrpSpPr/>
         <p:nvPr/>
       </p:nvGrpSpPr>
@@ -1120,7 +1446,7 @@
       </p:grpSpPr>
       <p:sp>
         <p:nvSpPr>
-          <p:cNvPr id="243" name="Google Shape;243;p6:notes"/>
+          <p:cNvPr id="250" name="Google Shape;250;p7:notes"/>
           <p:cNvSpPr txBox="1">
             <a:spLocks noGrp="1"/>
           </p:cNvSpPr>
@@ -1158,7 +1484,7 @@
       </p:sp>
       <p:sp>
         <p:nvSpPr>
-          <p:cNvPr id="244" name="Google Shape;244;p6:notes"/>
+          <p:cNvPr id="251" name="Google Shape;251;p7:notes"/>
           <p:cNvSpPr>
             <a:spLocks noGrp="1" noRot="1" noChangeAspect="1"/>
           </p:cNvSpPr>
@@ -1302,6 +1628,11 @@
         </p:spPr>
       </p:sp>
     </p:spTree>
+    <p:extLst>
+      <p:ext uri="{BB962C8B-B14F-4D97-AF65-F5344CB8AC3E}">
+        <p14:creationId xmlns:p14="http://schemas.microsoft.com/office/powerpoint/2010/main" val="2271428414"/>
+      </p:ext>
+    </p:extLst>
   </p:cSld>
   <p:clrMapOvr>
     <a:masterClrMapping/>
@@ -37897,6 +38228,317 @@
   <p:cSld>
     <p:spTree>
       <p:nvGrpSpPr>
+        <p:cNvPr id="1" name="Shape 252"/>
+        <p:cNvGrpSpPr/>
+        <p:nvPr/>
+      </p:nvGrpSpPr>
+      <p:grpSpPr>
+        <a:xfrm>
+          <a:off x="0" y="0"/>
+          <a:ext cx="0" cy="0"/>
+          <a:chOff x="0" y="0"/>
+          <a:chExt cx="0" cy="0"/>
+        </a:xfrm>
+      </p:grpSpPr>
+      <p:sp>
+        <p:nvSpPr>
+          <p:cNvPr id="253" name="Google Shape;253;p21"/>
+          <p:cNvSpPr txBox="1">
+            <a:spLocks noGrp="1"/>
+          </p:cNvSpPr>
+          <p:nvPr>
+            <p:ph type="title"/>
+          </p:nvPr>
+        </p:nvSpPr>
+        <p:spPr>
+          <a:xfrm>
+            <a:off x="380010" y="-4950"/>
+            <a:ext cx="6222671" cy="1224150"/>
+          </a:xfrm>
+          <a:prstGeom prst="rect">
+            <a:avLst/>
+          </a:prstGeom>
+          <a:noFill/>
+          <a:ln>
+            <a:noFill/>
+          </a:ln>
+        </p:spPr>
+        <p:txBody>
+          <a:bodyPr spcFirstLastPara="1" wrap="square" lIns="91425" tIns="45700" rIns="91425" bIns="45700" anchor="ctr" anchorCtr="0">
+            <a:noAutofit/>
+          </a:bodyPr>
+          <a:lstStyle/>
+          <a:p>
+            <a:pPr marL="0" lvl="0" indent="0" algn="l" rtl="0">
+              <a:spcBef>
+                <a:spcPts val="0"/>
+              </a:spcBef>
+              <a:spcAft>
+                <a:spcPts val="0"/>
+              </a:spcAft>
+              <a:buClr>
+                <a:schemeClr val="lt1"/>
+              </a:buClr>
+              <a:buSzPts val="2400"/>
+              <a:buFont typeface="Arial"/>
+              <a:buNone/>
+            </a:pPr>
+            <a:r>
+              <a:rPr lang="en-US" dirty="0"/>
+              <a:t>Maps</a:t>
+            </a:r>
+            <a:endParaRPr dirty="0"/>
+          </a:p>
+        </p:txBody>
+      </p:sp>
+      <p:sp>
+        <p:nvSpPr>
+          <p:cNvPr id="254" name="Google Shape;254;p21"/>
+          <p:cNvSpPr txBox="1">
+            <a:spLocks noGrp="1"/>
+          </p:cNvSpPr>
+          <p:nvPr>
+            <p:ph type="body" idx="1"/>
+          </p:nvPr>
+        </p:nvSpPr>
+        <p:spPr>
+          <a:xfrm>
+            <a:off x="380010" y="1481447"/>
+            <a:ext cx="8383980" cy="4882265"/>
+          </a:xfrm>
+          <a:prstGeom prst="rect">
+            <a:avLst/>
+          </a:prstGeom>
+          <a:noFill/>
+          <a:ln>
+            <a:noFill/>
+          </a:ln>
+        </p:spPr>
+        <p:txBody>
+          <a:bodyPr spcFirstLastPara="1" wrap="square" lIns="91425" tIns="45700" rIns="91425" bIns="45700" anchor="t" anchorCtr="0">
+            <a:normAutofit lnSpcReduction="10000"/>
+          </a:bodyPr>
+          <a:lstStyle/>
+          <a:p>
+            <a:pPr marL="342900" lvl="0" indent="-342900" algn="l" rtl="0">
+              <a:spcBef>
+                <a:spcPts val="0"/>
+              </a:spcBef>
+              <a:spcAft>
+                <a:spcPts val="0"/>
+              </a:spcAft>
+              <a:buSzPts val="2800"/>
+              <a:buChar char="•"/>
+            </a:pPr>
+            <a:r>
+              <a:rPr lang="en-US" dirty="0"/>
+              <a:t>HashMap</a:t>
+            </a:r>
+          </a:p>
+          <a:p>
+            <a:pPr marL="800100" lvl="1" indent="-342900">
+              <a:spcBef>
+                <a:spcPts val="0"/>
+              </a:spcBef>
+              <a:buSzPts val="2800"/>
+            </a:pPr>
+            <a:r>
+              <a:rPr lang="en-US" dirty="0"/>
+              <a:t>A collection that stores algorithmically data in Key-Value pairs, in which the value is linked to a key, and the key is then hashed and used as the index of the value.</a:t>
+            </a:r>
+          </a:p>
+          <a:p>
+            <a:pPr marL="342900" lvl="0" indent="-342900" algn="l" rtl="0">
+              <a:spcBef>
+                <a:spcPts val="0"/>
+              </a:spcBef>
+              <a:spcAft>
+                <a:spcPts val="0"/>
+              </a:spcAft>
+              <a:buSzPts val="2800"/>
+              <a:buChar char="•"/>
+            </a:pPr>
+            <a:r>
+              <a:rPr lang="en-US" dirty="0" err="1"/>
+              <a:t>HashTable</a:t>
+            </a:r>
+            <a:endParaRPr lang="en-US" dirty="0"/>
+          </a:p>
+          <a:p>
+            <a:pPr marL="800100" lvl="1" indent="-342900">
+              <a:spcBef>
+                <a:spcPts val="0"/>
+              </a:spcBef>
+              <a:buSzPts val="2800"/>
+            </a:pPr>
+            <a:r>
+              <a:rPr lang="en-US" dirty="0"/>
+              <a:t>Similar to a HashMap, however, a </a:t>
+            </a:r>
+            <a:r>
+              <a:rPr lang="en-US" dirty="0" err="1"/>
+              <a:t>HashTable</a:t>
+            </a:r>
+            <a:r>
+              <a:rPr lang="en-US" dirty="0"/>
+              <a:t> is synchronized (thread safe).</a:t>
+            </a:r>
+          </a:p>
+          <a:p>
+            <a:pPr marL="342900" lvl="0" indent="-342900" algn="l" rtl="0">
+              <a:spcBef>
+                <a:spcPts val="0"/>
+              </a:spcBef>
+              <a:spcAft>
+                <a:spcPts val="0"/>
+              </a:spcAft>
+              <a:buSzPts val="2800"/>
+              <a:buChar char="•"/>
+            </a:pPr>
+            <a:r>
+              <a:rPr lang="en-US" dirty="0" err="1"/>
+              <a:t>SortedMap</a:t>
+            </a:r>
+            <a:endParaRPr lang="en-US" dirty="0"/>
+          </a:p>
+          <a:p>
+            <a:pPr marL="800100" lvl="1" indent="-342900">
+              <a:spcBef>
+                <a:spcPts val="0"/>
+              </a:spcBef>
+              <a:buSzPts val="2800"/>
+            </a:pPr>
+            <a:r>
+              <a:rPr lang="en-US" dirty="0"/>
+              <a:t>A collection that stores data in Key-Value pairs and holds the keys in sorted order based on natural ordering or </a:t>
+            </a:r>
+            <a:r>
+              <a:rPr lang="en-US" sz="2400" dirty="0"/>
+              <a:t>based on the implementation of the Comparator interface for the elements in the collection</a:t>
+            </a:r>
+            <a:endParaRPr dirty="0"/>
+          </a:p>
+        </p:txBody>
+      </p:sp>
+      <p:sp>
+        <p:nvSpPr>
+          <p:cNvPr id="255" name="Google Shape;255;p21"/>
+          <p:cNvSpPr txBox="1">
+            <a:spLocks noGrp="1"/>
+          </p:cNvSpPr>
+          <p:nvPr>
+            <p:ph type="sldNum" idx="12"/>
+          </p:nvPr>
+        </p:nvSpPr>
+        <p:spPr>
+          <a:xfrm>
+            <a:off x="8122757" y="6363712"/>
+            <a:ext cx="861671" cy="365125"/>
+          </a:xfrm>
+          <a:prstGeom prst="rect">
+            <a:avLst/>
+          </a:prstGeom>
+          <a:noFill/>
+          <a:ln>
+            <a:noFill/>
+          </a:ln>
+        </p:spPr>
+        <p:txBody>
+          <a:bodyPr spcFirstLastPara="1" wrap="square" lIns="91425" tIns="45700" rIns="91425" bIns="45700" anchor="ctr" anchorCtr="0">
+            <a:noAutofit/>
+          </a:bodyPr>
+          <a:lstStyle/>
+          <a:p>
+            <a:pPr marL="0" marR="0" lvl="0" indent="0" algn="r" defTabSz="914400" rtl="0" eaLnBrk="1" fontAlgn="auto" latinLnBrk="0" hangingPunct="1">
+              <a:lnSpc>
+                <a:spcPct val="100000"/>
+              </a:lnSpc>
+              <a:spcBef>
+                <a:spcPts val="0"/>
+              </a:spcBef>
+              <a:spcAft>
+                <a:spcPts val="0"/>
+              </a:spcAft>
+              <a:buClr>
+                <a:srgbClr val="000000"/>
+              </a:buClr>
+              <a:buSzTx/>
+              <a:buFont typeface="Arial"/>
+              <a:buNone/>
+              <a:tabLst/>
+              <a:defRPr/>
+            </a:pPr>
+            <a:fld id="{00000000-1234-1234-1234-123412341234}" type="slidenum">
+              <a:rPr kumimoji="0" lang="en-US" sz="1200" b="0" i="0" u="none" strike="noStrike" kern="0" cap="none" spc="0" normalizeH="0" baseline="0" noProof="0">
+                <a:ln>
+                  <a:noFill/>
+                </a:ln>
+                <a:solidFill>
+                  <a:srgbClr val="A0A1A0"/>
+                </a:solidFill>
+                <a:effectLst/>
+                <a:uLnTx/>
+                <a:uFillTx/>
+                <a:latin typeface="Arial"/>
+                <a:cs typeface="Arial"/>
+                <a:sym typeface="Arial"/>
+              </a:rPr>
+              <a:pPr marL="0" marR="0" lvl="0" indent="0" algn="r" defTabSz="914400" rtl="0" eaLnBrk="1" fontAlgn="auto" latinLnBrk="0" hangingPunct="1">
+                <a:lnSpc>
+                  <a:spcPct val="100000"/>
+                </a:lnSpc>
+                <a:spcBef>
+                  <a:spcPts val="0"/>
+                </a:spcBef>
+                <a:spcAft>
+                  <a:spcPts val="0"/>
+                </a:spcAft>
+                <a:buClr>
+                  <a:srgbClr val="000000"/>
+                </a:buClr>
+                <a:buSzTx/>
+                <a:buFont typeface="Arial"/>
+                <a:buNone/>
+                <a:tabLst/>
+                <a:defRPr/>
+              </a:pPr>
+              <a:t>9</a:t>
+            </a:fld>
+            <a:endParaRPr kumimoji="0" sz="1200" b="0" i="0" u="none" strike="noStrike" kern="0" cap="none" spc="0" normalizeH="0" baseline="0" noProof="0">
+              <a:ln>
+                <a:noFill/>
+              </a:ln>
+              <a:solidFill>
+                <a:srgbClr val="A0A1A0"/>
+              </a:solidFill>
+              <a:effectLst/>
+              <a:uLnTx/>
+              <a:uFillTx/>
+              <a:latin typeface="Arial"/>
+              <a:cs typeface="Arial"/>
+              <a:sym typeface="Arial"/>
+            </a:endParaRPr>
+          </a:p>
+        </p:txBody>
+      </p:sp>
+    </p:spTree>
+    <p:extLst>
+      <p:ext uri="{BB962C8B-B14F-4D97-AF65-F5344CB8AC3E}">
+        <p14:creationId xmlns:p14="http://schemas.microsoft.com/office/powerpoint/2010/main" val="4120355330"/>
+      </p:ext>
+    </p:extLst>
+  </p:cSld>
+  <p:clrMapOvr>
+    <a:masterClrMapping/>
+  </p:clrMapOvr>
+</p:sld>
+</file>
+
+<file path=ppt/slides/slide11.xml><?xml version="1.0" encoding="utf-8"?>
+<p:sld xmlns:a="http://schemas.openxmlformats.org/drawingml/2006/main" xmlns:r="http://schemas.openxmlformats.org/officeDocument/2006/relationships" xmlns:p="http://schemas.openxmlformats.org/presentationml/2006/main">
+  <p:cSld>
+    <p:spTree>
+      <p:nvGrpSpPr>
         <p:cNvPr id="1" name="Shape 259"/>
         <p:cNvGrpSpPr/>
         <p:nvPr/>
@@ -38178,7 +38820,7 @@
             </a:pPr>
             <a:fld id="{00000000-1234-1234-1234-123412341234}" type="slidenum">
               <a:rPr lang="en-US"/>
-              <a:t>9</a:t>
+              <a:t>10</a:t>
             </a:fld>
             <a:endParaRPr/>
           </a:p>
@@ -38192,7 +38834,7 @@
 </p:sld>
 </file>
 
-<file path=ppt/slides/slide11.xml><?xml version="1.0" encoding="utf-8"?>
+<file path=ppt/slides/slide12.xml><?xml version="1.0" encoding="utf-8"?>
 <p:sld xmlns:a="http://schemas.openxmlformats.org/drawingml/2006/main" xmlns:r="http://schemas.openxmlformats.org/officeDocument/2006/relationships" xmlns:p="http://schemas.openxmlformats.org/presentationml/2006/main">
   <p:cSld>
     <p:spTree>
@@ -38556,7 +39198,7 @@
             </a:pPr>
             <a:fld id="{00000000-1234-1234-1234-123412341234}" type="slidenum">
               <a:rPr lang="en-US"/>
-              <a:t>10</a:t>
+              <a:t>11</a:t>
             </a:fld>
             <a:endParaRPr/>
           </a:p>
@@ -38570,7 +39212,7 @@
 </p:sld>
 </file>
 
-<file path=ppt/slides/slide12.xml><?xml version="1.0" encoding="utf-8"?>
+<file path=ppt/slides/slide13.xml><?xml version="1.0" encoding="utf-8"?>
 <p:sld xmlns:a="http://schemas.openxmlformats.org/drawingml/2006/main" xmlns:r="http://schemas.openxmlformats.org/officeDocument/2006/relationships" xmlns:p="http://schemas.openxmlformats.org/presentationml/2006/main">
   <p:cSld>
     <p:spTree>
@@ -39029,7 +39671,7 @@
             </a:pPr>
             <a:fld id="{00000000-1234-1234-1234-123412341234}" type="slidenum">
               <a:rPr lang="en-US"/>
-              <a:t>11</a:t>
+              <a:t>12</a:t>
             </a:fld>
             <a:endParaRPr/>
           </a:p>
@@ -39043,7 +39685,7 @@
 </p:sld>
 </file>
 
-<file path=ppt/slides/slide13.xml><?xml version="1.0" encoding="utf-8"?>
+<file path=ppt/slides/slide14.xml><?xml version="1.0" encoding="utf-8"?>
 <p:sld xmlns:a="http://schemas.openxmlformats.org/drawingml/2006/main" xmlns:r="http://schemas.openxmlformats.org/officeDocument/2006/relationships" xmlns:p="http://schemas.openxmlformats.org/presentationml/2006/main">
   <p:cSld>
     <p:spTree>
@@ -39809,7 +40451,7 @@
             </a:pPr>
             <a:fld id="{00000000-1234-1234-1234-123412341234}" type="slidenum">
               <a:rPr lang="en-US"/>
-              <a:t>12</a:t>
+              <a:t>13</a:t>
             </a:fld>
             <a:endParaRPr/>
           </a:p>
@@ -39823,12 +40465,12 @@
 </p:sld>
 </file>
 
-<file path=ppt/slides/slide2.xml><?xml version="1.0" encoding="utf-8"?>
+<file path=ppt/slides/slide15.xml><?xml version="1.0" encoding="utf-8"?>
 <p:sld xmlns:a="http://schemas.openxmlformats.org/drawingml/2006/main" xmlns:r="http://schemas.openxmlformats.org/officeDocument/2006/relationships" xmlns:p="http://schemas.openxmlformats.org/presentationml/2006/main">
   <p:cSld>
     <p:spTree>
       <p:nvGrpSpPr>
-        <p:cNvPr id="1" name="Shape 217"/>
+        <p:cNvPr id="1" name="Shape 245"/>
         <p:cNvGrpSpPr/>
         <p:nvPr/>
       </p:nvGrpSpPr>
@@ -39842,7 +40484,7 @@
       </p:grpSpPr>
       <p:sp>
         <p:nvSpPr>
-          <p:cNvPr id="218" name="Google Shape;218;p16"/>
+          <p:cNvPr id="246" name="Google Shape;246;p20"/>
           <p:cNvSpPr txBox="1">
             <a:spLocks noGrp="1"/>
           </p:cNvSpPr>
@@ -39885,7 +40527,7 @@
             </a:pPr>
             <a:r>
               <a:rPr lang="en-US"/>
-              <a:t>The Collection Interface</a:t>
+              <a:t>Collection vs Collections</a:t>
             </a:r>
             <a:endParaRPr/>
           </a:p>
@@ -39893,7 +40535,7 @@
       </p:sp>
       <p:sp>
         <p:nvSpPr>
-          <p:cNvPr id="219" name="Google Shape;219;p16"/>
+          <p:cNvPr id="247" name="Google Shape;247;p20"/>
           <p:cNvSpPr txBox="1">
             <a:spLocks noGrp="1"/>
           </p:cNvSpPr>
@@ -39931,40 +40573,61 @@
               <a:buChar char="•"/>
             </a:pPr>
             <a:r>
-              <a:rPr lang="en-US" dirty="0"/>
-              <a:t>The Collection interface defines a set of behaviors common to all collections in Java</a:t>
+              <a:rPr lang="en-US"/>
+              <a:t>Collection is an interface that declares mandatory behavior for collections</a:t>
             </a:r>
-            <a:endParaRPr dirty="0"/>
+            <a:endParaRPr/>
           </a:p>
           <a:p>
-            <a:pPr marL="742950" lvl="1" indent="-285750" algn="l" rtl="0">
+            <a:pPr marL="342900" lvl="0" indent="-165100" algn="l" rtl="0">
               <a:spcBef>
-                <a:spcPts val="480"/>
+                <a:spcPts val="560"/>
               </a:spcBef>
               <a:spcAft>
                 <a:spcPts val="0"/>
               </a:spcAft>
-              <a:buSzPts val="2400"/>
-              <a:buChar char="–"/>
+              <a:buSzPts val="2800"/>
+              <a:buNone/>
             </a:pPr>
-            <a:r>
-              <a:rPr lang="en-US" dirty="0"/>
-              <a:t>Except Maps…</a:t>
-            </a:r>
-            <a:endParaRPr dirty="0"/>
+            <a:endParaRPr/>
           </a:p>
           <a:p>
-            <a:pPr marL="742950" lvl="1" indent="-133350" algn="l" rtl="0">
+            <a:pPr marL="342900" lvl="0" indent="-342900" algn="l" rtl="0">
               <a:spcBef>
-                <a:spcPts val="480"/>
+                <a:spcPts val="560"/>
               </a:spcBef>
               <a:spcAft>
                 <a:spcPts val="0"/>
               </a:spcAft>
-              <a:buSzPts val="2400"/>
+              <a:buSzPts val="2800"/>
+              <a:buChar char="•"/>
+            </a:pPr>
+            <a:r>
+              <a:rPr lang="en-US"/>
+              <a:t>Collection</a:t>
+            </a:r>
+            <a:r>
+              <a:rPr lang="en-US" b="1" i="1" u="sng"/>
+              <a:t>s</a:t>
+            </a:r>
+            <a:r>
+              <a:rPr lang="en-US"/>
+              <a:t> is a utility class filled with static methods that can be run with Collection subclasses.</a:t>
+            </a:r>
+            <a:endParaRPr/>
+          </a:p>
+          <a:p>
+            <a:pPr marL="342900" lvl="0" indent="-165100" algn="l" rtl="0">
+              <a:spcBef>
+                <a:spcPts val="560"/>
+              </a:spcBef>
+              <a:spcAft>
+                <a:spcPts val="0"/>
+              </a:spcAft>
+              <a:buSzPts val="2800"/>
               <a:buNone/>
             </a:pPr>
-            <a:endParaRPr dirty="0"/>
+            <a:endParaRPr/>
           </a:p>
           <a:p>
             <a:pPr marL="342900" lvl="0" indent="-342900" algn="l" rtl="0">
@@ -39978,68 +40641,34 @@
               <a:buChar char="•"/>
             </a:pPr>
             <a:r>
-              <a:rPr lang="en-US" sz="2000" u="sng" dirty="0">
+              <a:rPr lang="en-US" sz="2000" u="sng">
                 <a:solidFill>
                   <a:schemeClr val="hlink"/>
                 </a:solidFill>
                 <a:hlinkClick r:id="rId3"/>
               </a:rPr>
-              <a:t>https://docs.oracle.com/javase/8/docs/api/java/util/Collection.html</a:t>
+              <a:t>https://docs.oracle.com/javase/8/docs/api/java/util/Collections.html</a:t>
             </a:r>
-            <a:endParaRPr sz="2000" dirty="0"/>
+            <a:endParaRPr sz="2000"/>
           </a:p>
           <a:p>
-            <a:pPr marL="342900" lvl="0" indent="-165100" algn="l" rtl="0">
+            <a:pPr marL="0" lvl="0" indent="0" algn="l" rtl="0">
               <a:spcBef>
-                <a:spcPts val="560"/>
+                <a:spcPts val="400"/>
               </a:spcBef>
               <a:spcAft>
                 <a:spcPts val="0"/>
               </a:spcAft>
-              <a:buSzPts val="2800"/>
+              <a:buSzPts val="2000"/>
               <a:buNone/>
             </a:pPr>
-            <a:endParaRPr dirty="0"/>
-          </a:p>
-          <a:p>
-            <a:pPr marL="342900" lvl="0" indent="-342900" algn="l" rtl="0">
-              <a:spcBef>
-                <a:spcPts val="560"/>
-              </a:spcBef>
-              <a:spcAft>
-                <a:spcPts val="0"/>
-              </a:spcAft>
-              <a:buSzPts val="2800"/>
-              <a:buChar char="•"/>
-            </a:pPr>
-            <a:r>
-              <a:rPr lang="en-US" dirty="0"/>
-              <a:t>Collection-interface-collections can are generally different types of Lists, Sets, and Queues</a:t>
-            </a:r>
-            <a:endParaRPr dirty="0"/>
-          </a:p>
-          <a:p>
-            <a:pPr marL="742950" lvl="1" indent="-285750" algn="l" rtl="0">
-              <a:spcBef>
-                <a:spcPts val="480"/>
-              </a:spcBef>
-              <a:spcAft>
-                <a:spcPts val="0"/>
-              </a:spcAft>
-              <a:buSzPts val="2400"/>
-              <a:buChar char="–"/>
-            </a:pPr>
-            <a:r>
-              <a:rPr lang="en-US" dirty="0"/>
-              <a:t>List, Set, and Queue are their own interfaces as well</a:t>
-            </a:r>
-            <a:endParaRPr dirty="0"/>
+            <a:endParaRPr sz="2000"/>
           </a:p>
         </p:txBody>
       </p:sp>
       <p:sp>
         <p:nvSpPr>
-          <p:cNvPr id="220" name="Google Shape;220;p16"/>
+          <p:cNvPr id="248" name="Google Shape;248;p20"/>
           <p:cNvSpPr txBox="1">
             <a:spLocks noGrp="1"/>
           </p:cNvSpPr>
@@ -40077,7 +40706,7 @@
             </a:pPr>
             <a:fld id="{00000000-1234-1234-1234-123412341234}" type="slidenum">
               <a:rPr lang="en-US"/>
-              <a:t>1</a:t>
+              <a:t>14</a:t>
             </a:fld>
             <a:endParaRPr/>
           </a:p>
@@ -40091,7 +40720,716 @@
 </p:sld>
 </file>
 
-<file path=ppt/slides/slide3.xml><?xml version="1.0" encoding="utf-8"?>
+<file path=ppt/slides/slide16.xml><?xml version="1.0" encoding="utf-8"?>
+<p:sld xmlns:a="http://schemas.openxmlformats.org/drawingml/2006/main" xmlns:r="http://schemas.openxmlformats.org/officeDocument/2006/relationships" xmlns:p="http://schemas.openxmlformats.org/presentationml/2006/main">
+  <p:cSld>
+    <p:spTree>
+      <p:nvGrpSpPr>
+        <p:cNvPr id="1" name="Shape 245"/>
+        <p:cNvGrpSpPr/>
+        <p:nvPr/>
+      </p:nvGrpSpPr>
+      <p:grpSpPr>
+        <a:xfrm>
+          <a:off x="0" y="0"/>
+          <a:ext cx="0" cy="0"/>
+          <a:chOff x="0" y="0"/>
+          <a:chExt cx="0" cy="0"/>
+        </a:xfrm>
+      </p:grpSpPr>
+      <p:sp>
+        <p:nvSpPr>
+          <p:cNvPr id="246" name="Google Shape;246;p20"/>
+          <p:cNvSpPr txBox="1">
+            <a:spLocks noGrp="1"/>
+          </p:cNvSpPr>
+          <p:nvPr>
+            <p:ph type="title"/>
+          </p:nvPr>
+        </p:nvSpPr>
+        <p:spPr>
+          <a:xfrm>
+            <a:off x="380010" y="-4950"/>
+            <a:ext cx="6222671" cy="1224150"/>
+          </a:xfrm>
+          <a:prstGeom prst="rect">
+            <a:avLst/>
+          </a:prstGeom>
+          <a:noFill/>
+          <a:ln>
+            <a:noFill/>
+          </a:ln>
+        </p:spPr>
+        <p:txBody>
+          <a:bodyPr spcFirstLastPara="1" wrap="square" lIns="91425" tIns="45700" rIns="91425" bIns="45700" anchor="ctr" anchorCtr="0">
+            <a:noAutofit/>
+          </a:bodyPr>
+          <a:lstStyle/>
+          <a:p>
+            <a:pPr marL="0" lvl="0" indent="0" algn="l" rtl="0">
+              <a:spcBef>
+                <a:spcPts val="0"/>
+              </a:spcBef>
+              <a:spcAft>
+                <a:spcPts val="0"/>
+              </a:spcAft>
+              <a:buClr>
+                <a:schemeClr val="lt1"/>
+              </a:buClr>
+              <a:buSzPts val="2400"/>
+              <a:buFont typeface="Arial"/>
+              <a:buNone/>
+            </a:pPr>
+            <a:r>
+              <a:rPr lang="en-US" dirty="0"/>
+              <a:t>Collections</a:t>
+            </a:r>
+            <a:endParaRPr dirty="0"/>
+          </a:p>
+        </p:txBody>
+      </p:sp>
+      <p:sp>
+        <p:nvSpPr>
+          <p:cNvPr id="247" name="Google Shape;247;p20"/>
+          <p:cNvSpPr txBox="1">
+            <a:spLocks noGrp="1"/>
+          </p:cNvSpPr>
+          <p:nvPr>
+            <p:ph type="body" idx="1"/>
+          </p:nvPr>
+        </p:nvSpPr>
+        <p:spPr>
+          <a:xfrm>
+            <a:off x="380010" y="1481446"/>
+            <a:ext cx="8383980" cy="4786004"/>
+          </a:xfrm>
+          <a:prstGeom prst="rect">
+            <a:avLst/>
+          </a:prstGeom>
+          <a:noFill/>
+          <a:ln>
+            <a:noFill/>
+          </a:ln>
+        </p:spPr>
+        <p:txBody>
+          <a:bodyPr spcFirstLastPara="1" wrap="square" lIns="91425" tIns="45700" rIns="91425" bIns="45700" anchor="t" anchorCtr="0">
+            <a:normAutofit lnSpcReduction="10000"/>
+          </a:bodyPr>
+          <a:lstStyle/>
+          <a:p>
+            <a:pPr marL="342900" lvl="0" indent="-342900" algn="l" rtl="0">
+              <a:spcBef>
+                <a:spcPts val="0"/>
+              </a:spcBef>
+              <a:spcAft>
+                <a:spcPts val="0"/>
+              </a:spcAft>
+              <a:buSzPts val="2800"/>
+              <a:buChar char="•"/>
+            </a:pPr>
+            <a:r>
+              <a:rPr lang="en-US" dirty="0"/>
+              <a:t>Some of these static methods </a:t>
+            </a:r>
+            <a:r>
+              <a:rPr lang="en-US" dirty="0" err="1"/>
+              <a:t>inlcude</a:t>
+            </a:r>
+            <a:r>
+              <a:rPr lang="en-US" dirty="0"/>
+              <a:t>:</a:t>
+            </a:r>
+          </a:p>
+          <a:p>
+            <a:pPr marL="342900" lvl="0" indent="-342900" algn="l" rtl="0">
+              <a:spcBef>
+                <a:spcPts val="0"/>
+              </a:spcBef>
+              <a:spcAft>
+                <a:spcPts val="0"/>
+              </a:spcAft>
+              <a:buSzPts val="2800"/>
+              <a:buChar char="•"/>
+            </a:pPr>
+            <a:r>
+              <a:rPr lang="en-US" dirty="0">
+                <a:latin typeface="Courier New" panose="02070309020205020404" pitchFamily="49" charset="0"/>
+                <a:cs typeface="Courier New" panose="02070309020205020404" pitchFamily="49" charset="0"/>
+              </a:rPr>
+              <a:t>reverse()</a:t>
+            </a:r>
+          </a:p>
+          <a:p>
+            <a:pPr marL="800100" lvl="1" indent="-342900">
+              <a:spcBef>
+                <a:spcPts val="0"/>
+              </a:spcBef>
+              <a:buSzPts val="2800"/>
+              <a:buChar char="•"/>
+            </a:pPr>
+            <a:r>
+              <a:rPr lang="en-US" dirty="0"/>
+              <a:t>A method that takes a list and reverses the order of elements in that specified list.</a:t>
+            </a:r>
+          </a:p>
+          <a:p>
+            <a:pPr marL="342900" indent="-342900">
+              <a:spcBef>
+                <a:spcPts val="0"/>
+              </a:spcBef>
+            </a:pPr>
+            <a:r>
+              <a:rPr lang="en-US" dirty="0">
+                <a:latin typeface="Courier New" panose="02070309020205020404" pitchFamily="49" charset="0"/>
+                <a:cs typeface="Courier New" panose="02070309020205020404" pitchFamily="49" charset="0"/>
+              </a:rPr>
+              <a:t>shuffle()</a:t>
+            </a:r>
+          </a:p>
+          <a:p>
+            <a:pPr marL="800100" lvl="1" indent="-342900">
+              <a:spcBef>
+                <a:spcPts val="0"/>
+              </a:spcBef>
+            </a:pPr>
+            <a:r>
+              <a:rPr lang="en-US" dirty="0"/>
+              <a:t>A method that randomly places elements within a list.</a:t>
+            </a:r>
+          </a:p>
+          <a:p>
+            <a:pPr marL="342900" indent="-342900">
+              <a:spcBef>
+                <a:spcPts val="0"/>
+              </a:spcBef>
+            </a:pPr>
+            <a:r>
+              <a:rPr lang="en-US" dirty="0">
+                <a:latin typeface="Courier New" panose="02070309020205020404" pitchFamily="49" charset="0"/>
+                <a:cs typeface="Courier New" panose="02070309020205020404" pitchFamily="49" charset="0"/>
+              </a:rPr>
+              <a:t>sort()</a:t>
+            </a:r>
+          </a:p>
+          <a:p>
+            <a:pPr marL="800100" lvl="1" indent="-342900">
+              <a:spcBef>
+                <a:spcPts val="0"/>
+              </a:spcBef>
+            </a:pPr>
+            <a:r>
+              <a:rPr lang="en-US" dirty="0"/>
+              <a:t>An overloaded method that takes a list (byte, char, double, float, int, long, short or object) and potentially a comparator, placing the elements in specified order according to natural ordering (if no comparator is given and a natural ordering exists in the </a:t>
+            </a:r>
+            <a:r>
+              <a:rPr lang="en-US" dirty="0" err="1"/>
+              <a:t>jvm</a:t>
+            </a:r>
+            <a:r>
+              <a:rPr lang="en-US" dirty="0"/>
+              <a:t>) or the order specified by the comparator. </a:t>
+            </a:r>
+          </a:p>
+        </p:txBody>
+      </p:sp>
+      <p:sp>
+        <p:nvSpPr>
+          <p:cNvPr id="248" name="Google Shape;248;p20"/>
+          <p:cNvSpPr txBox="1">
+            <a:spLocks noGrp="1"/>
+          </p:cNvSpPr>
+          <p:nvPr>
+            <p:ph type="sldNum" idx="12"/>
+          </p:nvPr>
+        </p:nvSpPr>
+        <p:spPr>
+          <a:xfrm>
+            <a:off x="8122757" y="6363712"/>
+            <a:ext cx="861671" cy="365125"/>
+          </a:xfrm>
+          <a:prstGeom prst="rect">
+            <a:avLst/>
+          </a:prstGeom>
+          <a:noFill/>
+          <a:ln>
+            <a:noFill/>
+          </a:ln>
+        </p:spPr>
+        <p:txBody>
+          <a:bodyPr spcFirstLastPara="1" wrap="square" lIns="91425" tIns="45700" rIns="91425" bIns="45700" anchor="ctr" anchorCtr="0">
+            <a:noAutofit/>
+          </a:bodyPr>
+          <a:lstStyle/>
+          <a:p>
+            <a:pPr marL="0" marR="0" lvl="0" indent="0" algn="r" defTabSz="914400" rtl="0" eaLnBrk="1" fontAlgn="auto" latinLnBrk="0" hangingPunct="1">
+              <a:lnSpc>
+                <a:spcPct val="100000"/>
+              </a:lnSpc>
+              <a:spcBef>
+                <a:spcPts val="0"/>
+              </a:spcBef>
+              <a:spcAft>
+                <a:spcPts val="0"/>
+              </a:spcAft>
+              <a:buClr>
+                <a:srgbClr val="000000"/>
+              </a:buClr>
+              <a:buSzTx/>
+              <a:buFont typeface="Arial"/>
+              <a:buNone/>
+              <a:tabLst/>
+              <a:defRPr/>
+            </a:pPr>
+            <a:fld id="{00000000-1234-1234-1234-123412341234}" type="slidenum">
+              <a:rPr kumimoji="0" lang="en-US" sz="1200" b="0" i="0" u="none" strike="noStrike" kern="0" cap="none" spc="0" normalizeH="0" baseline="0" noProof="0">
+                <a:ln>
+                  <a:noFill/>
+                </a:ln>
+                <a:solidFill>
+                  <a:srgbClr val="A0A1A0"/>
+                </a:solidFill>
+                <a:effectLst/>
+                <a:uLnTx/>
+                <a:uFillTx/>
+                <a:latin typeface="Arial"/>
+                <a:cs typeface="Arial"/>
+                <a:sym typeface="Arial"/>
+              </a:rPr>
+              <a:pPr marL="0" marR="0" lvl="0" indent="0" algn="r" defTabSz="914400" rtl="0" eaLnBrk="1" fontAlgn="auto" latinLnBrk="0" hangingPunct="1">
+                <a:lnSpc>
+                  <a:spcPct val="100000"/>
+                </a:lnSpc>
+                <a:spcBef>
+                  <a:spcPts val="0"/>
+                </a:spcBef>
+                <a:spcAft>
+                  <a:spcPts val="0"/>
+                </a:spcAft>
+                <a:buClr>
+                  <a:srgbClr val="000000"/>
+                </a:buClr>
+                <a:buSzTx/>
+                <a:buFont typeface="Arial"/>
+                <a:buNone/>
+                <a:tabLst/>
+                <a:defRPr/>
+              </a:pPr>
+              <a:t>15</a:t>
+            </a:fld>
+            <a:endParaRPr kumimoji="0" sz="1200" b="0" i="0" u="none" strike="noStrike" kern="0" cap="none" spc="0" normalizeH="0" baseline="0" noProof="0">
+              <a:ln>
+                <a:noFill/>
+              </a:ln>
+              <a:solidFill>
+                <a:srgbClr val="A0A1A0"/>
+              </a:solidFill>
+              <a:effectLst/>
+              <a:uLnTx/>
+              <a:uFillTx/>
+              <a:latin typeface="Arial"/>
+              <a:cs typeface="Arial"/>
+              <a:sym typeface="Arial"/>
+            </a:endParaRPr>
+          </a:p>
+        </p:txBody>
+      </p:sp>
+    </p:spTree>
+    <p:extLst>
+      <p:ext uri="{BB962C8B-B14F-4D97-AF65-F5344CB8AC3E}">
+        <p14:creationId xmlns:p14="http://schemas.microsoft.com/office/powerpoint/2010/main" val="1065525646"/>
+      </p:ext>
+    </p:extLst>
+  </p:cSld>
+  <p:clrMapOvr>
+    <a:masterClrMapping/>
+  </p:clrMapOvr>
+</p:sld>
+</file>
+
+<file path=ppt/slides/slide17.xml><?xml version="1.0" encoding="utf-8"?>
+<p:sld xmlns:a="http://schemas.openxmlformats.org/drawingml/2006/main" xmlns:r="http://schemas.openxmlformats.org/officeDocument/2006/relationships" xmlns:p="http://schemas.openxmlformats.org/presentationml/2006/main">
+  <p:cSld>
+    <p:spTree>
+      <p:nvGrpSpPr>
+        <p:cNvPr id="1" name="Shape 245"/>
+        <p:cNvGrpSpPr/>
+        <p:nvPr/>
+      </p:nvGrpSpPr>
+      <p:grpSpPr>
+        <a:xfrm>
+          <a:off x="0" y="0"/>
+          <a:ext cx="0" cy="0"/>
+          <a:chOff x="0" y="0"/>
+          <a:chExt cx="0" cy="0"/>
+        </a:xfrm>
+      </p:grpSpPr>
+      <p:sp>
+        <p:nvSpPr>
+          <p:cNvPr id="246" name="Google Shape;246;p20"/>
+          <p:cNvSpPr txBox="1">
+            <a:spLocks noGrp="1"/>
+          </p:cNvSpPr>
+          <p:nvPr>
+            <p:ph type="title"/>
+          </p:nvPr>
+        </p:nvSpPr>
+        <p:spPr>
+          <a:xfrm>
+            <a:off x="380010" y="-4950"/>
+            <a:ext cx="6222671" cy="1224150"/>
+          </a:xfrm>
+          <a:prstGeom prst="rect">
+            <a:avLst/>
+          </a:prstGeom>
+          <a:noFill/>
+          <a:ln>
+            <a:noFill/>
+          </a:ln>
+        </p:spPr>
+        <p:txBody>
+          <a:bodyPr spcFirstLastPara="1" wrap="square" lIns="91425" tIns="45700" rIns="91425" bIns="45700" anchor="ctr" anchorCtr="0">
+            <a:noAutofit/>
+          </a:bodyPr>
+          <a:lstStyle/>
+          <a:p>
+            <a:pPr marL="0" lvl="0" indent="0" algn="l" rtl="0">
+              <a:spcBef>
+                <a:spcPts val="0"/>
+              </a:spcBef>
+              <a:spcAft>
+                <a:spcPts val="0"/>
+              </a:spcAft>
+              <a:buClr>
+                <a:schemeClr val="lt1"/>
+              </a:buClr>
+              <a:buSzPts val="2400"/>
+              <a:buFont typeface="Arial"/>
+              <a:buNone/>
+            </a:pPr>
+            <a:r>
+              <a:rPr lang="en-US" dirty="0"/>
+              <a:t>Arrays</a:t>
+            </a:r>
+            <a:endParaRPr dirty="0"/>
+          </a:p>
+        </p:txBody>
+      </p:sp>
+      <p:sp>
+        <p:nvSpPr>
+          <p:cNvPr id="247" name="Google Shape;247;p20"/>
+          <p:cNvSpPr txBox="1">
+            <a:spLocks noGrp="1"/>
+          </p:cNvSpPr>
+          <p:nvPr>
+            <p:ph type="body" idx="1"/>
+          </p:nvPr>
+        </p:nvSpPr>
+        <p:spPr>
+          <a:xfrm>
+            <a:off x="380010" y="1481446"/>
+            <a:ext cx="8383980" cy="4786004"/>
+          </a:xfrm>
+          <a:prstGeom prst="rect">
+            <a:avLst/>
+          </a:prstGeom>
+          <a:noFill/>
+          <a:ln>
+            <a:noFill/>
+          </a:ln>
+        </p:spPr>
+        <p:txBody>
+          <a:bodyPr spcFirstLastPara="1" wrap="square" lIns="91425" tIns="45700" rIns="91425" bIns="45700" anchor="t" anchorCtr="0">
+            <a:normAutofit fontScale="77500" lnSpcReduction="20000"/>
+          </a:bodyPr>
+          <a:lstStyle/>
+          <a:p>
+            <a:pPr marL="342900" lvl="0" indent="-342900" algn="l" rtl="0">
+              <a:spcBef>
+                <a:spcPts val="0"/>
+              </a:spcBef>
+              <a:spcAft>
+                <a:spcPts val="0"/>
+              </a:spcAft>
+              <a:buSzPts val="2800"/>
+              <a:buChar char="•"/>
+            </a:pPr>
+            <a:r>
+              <a:rPr lang="en-US" dirty="0"/>
+              <a:t>Arrays is a utility class that can be used on array objects, such as sorting, index, </a:t>
+            </a:r>
+            <a:r>
+              <a:rPr lang="en-US" dirty="0" err="1"/>
+              <a:t>etc</a:t>
+            </a:r>
+            <a:r>
+              <a:rPr lang="en-US" dirty="0"/>
+              <a:t>…</a:t>
+            </a:r>
+          </a:p>
+          <a:p>
+            <a:pPr marL="342900" lvl="0" indent="-342900" algn="l" rtl="0">
+              <a:spcBef>
+                <a:spcPts val="0"/>
+              </a:spcBef>
+              <a:spcAft>
+                <a:spcPts val="0"/>
+              </a:spcAft>
+              <a:buSzPts val="2800"/>
+              <a:buChar char="•"/>
+            </a:pPr>
+            <a:r>
+              <a:rPr lang="en-US" dirty="0"/>
+              <a:t>Some of these static methods include:</a:t>
+            </a:r>
+          </a:p>
+          <a:p>
+            <a:pPr marL="342900" lvl="0" indent="-342900" algn="l" rtl="0">
+              <a:spcBef>
+                <a:spcPts val="0"/>
+              </a:spcBef>
+              <a:spcAft>
+                <a:spcPts val="0"/>
+              </a:spcAft>
+              <a:buSzPts val="2800"/>
+              <a:buChar char="•"/>
+            </a:pPr>
+            <a:r>
+              <a:rPr lang="en-US" dirty="0" err="1">
+                <a:latin typeface="Courier New" panose="02070309020205020404" pitchFamily="49" charset="0"/>
+                <a:cs typeface="Courier New" panose="02070309020205020404" pitchFamily="49" charset="0"/>
+              </a:rPr>
+              <a:t>toString</a:t>
+            </a:r>
+            <a:r>
+              <a:rPr lang="en-US" dirty="0">
+                <a:latin typeface="Courier New" panose="02070309020205020404" pitchFamily="49" charset="0"/>
+                <a:cs typeface="Courier New" panose="02070309020205020404" pitchFamily="49" charset="0"/>
+              </a:rPr>
+              <a:t>()</a:t>
+            </a:r>
+          </a:p>
+          <a:p>
+            <a:pPr marL="800100" lvl="1" indent="-342900">
+              <a:spcBef>
+                <a:spcPts val="0"/>
+              </a:spcBef>
+              <a:buSzPts val="2800"/>
+              <a:buChar char="•"/>
+            </a:pPr>
+            <a:r>
+              <a:rPr lang="en-US" dirty="0"/>
+              <a:t>An overloaded </a:t>
+            </a:r>
+            <a:r>
+              <a:rPr lang="en-US" dirty="0" err="1"/>
+              <a:t>toString</a:t>
+            </a:r>
+            <a:r>
+              <a:rPr lang="en-US" dirty="0"/>
+              <a:t> methods which takes a </a:t>
+            </a:r>
+            <a:r>
+              <a:rPr lang="en-US" dirty="0" err="1"/>
+              <a:t>boolean</a:t>
+            </a:r>
+            <a:r>
+              <a:rPr lang="en-US" dirty="0"/>
+              <a:t>, byte, char, double, float, int, long, short or object array, and prints a string representation of the contents within the array.</a:t>
+            </a:r>
+          </a:p>
+          <a:p>
+            <a:pPr marL="342900" indent="-342900">
+              <a:spcBef>
+                <a:spcPts val="0"/>
+              </a:spcBef>
+            </a:pPr>
+            <a:r>
+              <a:rPr lang="en-US" dirty="0" err="1">
+                <a:latin typeface="Courier New" panose="02070309020205020404" pitchFamily="49" charset="0"/>
+                <a:cs typeface="Courier New" panose="02070309020205020404" pitchFamily="49" charset="0"/>
+              </a:rPr>
+              <a:t>binarySearch</a:t>
+            </a:r>
+            <a:r>
+              <a:rPr lang="en-US" dirty="0">
+                <a:latin typeface="Courier New" panose="02070309020205020404" pitchFamily="49" charset="0"/>
+                <a:cs typeface="Courier New" panose="02070309020205020404" pitchFamily="49" charset="0"/>
+              </a:rPr>
+              <a:t>()</a:t>
+            </a:r>
+          </a:p>
+          <a:p>
+            <a:pPr marL="800100" lvl="1" indent="-342900">
+              <a:spcBef>
+                <a:spcPts val="0"/>
+              </a:spcBef>
+            </a:pPr>
+            <a:r>
+              <a:rPr lang="en-US" dirty="0"/>
+              <a:t>An overloaded method that takes two parameters an array (byte, char, double, float, int, long, short or object) and a value with a matching datatype. It then performs a binary search on the given array for the given value. </a:t>
+            </a:r>
+          </a:p>
+          <a:p>
+            <a:pPr marL="800100" lvl="1" indent="-342900">
+              <a:spcBef>
+                <a:spcPts val="0"/>
+              </a:spcBef>
+            </a:pPr>
+            <a:r>
+              <a:rPr lang="en-US" dirty="0"/>
+              <a:t>This method assumes that the array provided is sorted.</a:t>
+            </a:r>
+          </a:p>
+          <a:p>
+            <a:pPr marL="342900" indent="-342900">
+              <a:spcBef>
+                <a:spcPts val="0"/>
+              </a:spcBef>
+            </a:pPr>
+            <a:r>
+              <a:rPr lang="en-US" dirty="0">
+                <a:latin typeface="Courier New" panose="02070309020205020404" pitchFamily="49" charset="0"/>
+                <a:cs typeface="Courier New" panose="02070309020205020404" pitchFamily="49" charset="0"/>
+              </a:rPr>
+              <a:t>sort()</a:t>
+            </a:r>
+          </a:p>
+          <a:p>
+            <a:pPr marL="800100" lvl="1" indent="-342900">
+              <a:spcBef>
+                <a:spcPts val="0"/>
+              </a:spcBef>
+            </a:pPr>
+            <a:r>
+              <a:rPr lang="en-US" dirty="0"/>
+              <a:t>An overloaded method that takes an array (byte, char, double, float, int, long, short or object) and sorts the values in ascending numerical order. When given an Object array, the ordering of the objects can only be performed if the object implements the comparable interface and provides an implementation for the </a:t>
+            </a:r>
+            <a:r>
+              <a:rPr lang="en-US" dirty="0" err="1"/>
+              <a:t>compareTo</a:t>
+            </a:r>
+            <a:r>
+              <a:rPr lang="en-US" dirty="0"/>
+              <a:t> method</a:t>
+            </a:r>
+          </a:p>
+        </p:txBody>
+      </p:sp>
+      <p:sp>
+        <p:nvSpPr>
+          <p:cNvPr id="248" name="Google Shape;248;p20"/>
+          <p:cNvSpPr txBox="1">
+            <a:spLocks noGrp="1"/>
+          </p:cNvSpPr>
+          <p:nvPr>
+            <p:ph type="sldNum" idx="12"/>
+          </p:nvPr>
+        </p:nvSpPr>
+        <p:spPr>
+          <a:xfrm>
+            <a:off x="8122757" y="6363712"/>
+            <a:ext cx="861671" cy="365125"/>
+          </a:xfrm>
+          <a:prstGeom prst="rect">
+            <a:avLst/>
+          </a:prstGeom>
+          <a:noFill/>
+          <a:ln>
+            <a:noFill/>
+          </a:ln>
+        </p:spPr>
+        <p:txBody>
+          <a:bodyPr spcFirstLastPara="1" wrap="square" lIns="91425" tIns="45700" rIns="91425" bIns="45700" anchor="ctr" anchorCtr="0">
+            <a:noAutofit/>
+          </a:bodyPr>
+          <a:lstStyle/>
+          <a:p>
+            <a:pPr marL="0" marR="0" lvl="0" indent="0" algn="r" defTabSz="914400" rtl="0" eaLnBrk="1" fontAlgn="auto" latinLnBrk="0" hangingPunct="1">
+              <a:lnSpc>
+                <a:spcPct val="100000"/>
+              </a:lnSpc>
+              <a:spcBef>
+                <a:spcPts val="0"/>
+              </a:spcBef>
+              <a:spcAft>
+                <a:spcPts val="0"/>
+              </a:spcAft>
+              <a:buClr>
+                <a:srgbClr val="000000"/>
+              </a:buClr>
+              <a:buSzTx/>
+              <a:buFont typeface="Arial"/>
+              <a:buNone/>
+              <a:tabLst/>
+              <a:defRPr/>
+            </a:pPr>
+            <a:fld id="{00000000-1234-1234-1234-123412341234}" type="slidenum">
+              <a:rPr kumimoji="0" lang="en-US" sz="1200" b="0" i="0" u="none" strike="noStrike" kern="0" cap="none" spc="0" normalizeH="0" baseline="0" noProof="0">
+                <a:ln>
+                  <a:noFill/>
+                </a:ln>
+                <a:solidFill>
+                  <a:srgbClr val="A0A1A0"/>
+                </a:solidFill>
+                <a:effectLst/>
+                <a:uLnTx/>
+                <a:uFillTx/>
+                <a:latin typeface="Arial"/>
+                <a:cs typeface="Arial"/>
+                <a:sym typeface="Arial"/>
+              </a:rPr>
+              <a:pPr marL="0" marR="0" lvl="0" indent="0" algn="r" defTabSz="914400" rtl="0" eaLnBrk="1" fontAlgn="auto" latinLnBrk="0" hangingPunct="1">
+                <a:lnSpc>
+                  <a:spcPct val="100000"/>
+                </a:lnSpc>
+                <a:spcBef>
+                  <a:spcPts val="0"/>
+                </a:spcBef>
+                <a:spcAft>
+                  <a:spcPts val="0"/>
+                </a:spcAft>
+                <a:buClr>
+                  <a:srgbClr val="000000"/>
+                </a:buClr>
+                <a:buSzTx/>
+                <a:buFont typeface="Arial"/>
+                <a:buNone/>
+                <a:tabLst/>
+                <a:defRPr/>
+              </a:pPr>
+              <a:t>16</a:t>
+            </a:fld>
+            <a:endParaRPr kumimoji="0" sz="1200" b="0" i="0" u="none" strike="noStrike" kern="0" cap="none" spc="0" normalizeH="0" baseline="0" noProof="0">
+              <a:ln>
+                <a:noFill/>
+              </a:ln>
+              <a:solidFill>
+                <a:srgbClr val="A0A1A0"/>
+              </a:solidFill>
+              <a:effectLst/>
+              <a:uLnTx/>
+              <a:uFillTx/>
+              <a:latin typeface="Arial"/>
+              <a:cs typeface="Arial"/>
+              <a:sym typeface="Arial"/>
+            </a:endParaRPr>
+          </a:p>
+        </p:txBody>
+      </p:sp>
+    </p:spTree>
+    <p:extLst>
+      <p:ext uri="{BB962C8B-B14F-4D97-AF65-F5344CB8AC3E}">
+        <p14:creationId xmlns:p14="http://schemas.microsoft.com/office/powerpoint/2010/main" val="2190487021"/>
+      </p:ext>
+    </p:extLst>
+  </p:cSld>
+  <p:clrMapOvr>
+    <a:masterClrMapping/>
+  </p:clrMapOvr>
+</p:sld>
+</file>
+
+<file path=ppt/slides/slide2.xml><?xml version="1.0" encoding="utf-8"?>
 <p:sld xmlns:a="http://schemas.openxmlformats.org/drawingml/2006/main" xmlns:r="http://schemas.openxmlformats.org/officeDocument/2006/relationships" xmlns:p="http://schemas.openxmlformats.org/presentationml/2006/main">
   <p:cSld>
     <p:spTree>
@@ -40129,7 +41467,35 @@
           <a:bodyPr/>
           <a:lstStyle/>
           <a:p>
-            <a:endParaRPr lang="en-US"/>
+            <a:r>
+              <a:rPr lang="en-US" dirty="0"/>
+              <a:t>Collection Hierarchy (recap)</a:t>
+            </a:r>
+          </a:p>
+        </p:txBody>
+      </p:sp>
+      <p:sp>
+        <p:nvSpPr>
+          <p:cNvPr id="3" name="Text Placeholder 2">
+            <a:extLst>
+              <a:ext uri="{FF2B5EF4-FFF2-40B4-BE49-F238E27FC236}">
+                <a16:creationId xmlns:a16="http://schemas.microsoft.com/office/drawing/2014/main" id="{C9F2426F-D5F3-4D3A-A712-BEC20D2F7686}"/>
+              </a:ext>
+            </a:extLst>
+          </p:cNvPr>
+          <p:cNvSpPr>
+            <a:spLocks noGrp="1"/>
+          </p:cNvSpPr>
+          <p:nvPr>
+            <p:ph type="body" idx="1"/>
+          </p:nvPr>
+        </p:nvSpPr>
+        <p:spPr/>
+        <p:txBody>
+          <a:bodyPr/>
+          <a:lstStyle/>
+          <a:p>
+            <a:endParaRPr lang="en-US" dirty="0"/>
           </a:p>
         </p:txBody>
       </p:sp>
@@ -40154,20 +41520,75 @@
           <a:bodyPr/>
           <a:lstStyle/>
           <a:p>
-            <a:pPr marL="0" lvl="0" indent="0" algn="r" rtl="0">
+            <a:pPr marL="0" marR="0" lvl="0" indent="0" algn="r" defTabSz="914400" rtl="0" eaLnBrk="1" fontAlgn="auto" latinLnBrk="0" hangingPunct="1">
+              <a:lnSpc>
+                <a:spcPct val="100000"/>
+              </a:lnSpc>
               <a:spcBef>
                 <a:spcPts val="0"/>
               </a:spcBef>
               <a:spcAft>
                 <a:spcPts val="0"/>
               </a:spcAft>
+              <a:buClr>
+                <a:srgbClr val="000000"/>
+              </a:buClr>
+              <a:buSzTx/>
+              <a:buFont typeface="Arial"/>
               <a:buNone/>
+              <a:tabLst/>
+              <a:defRPr/>
             </a:pPr>
             <a:fld id="{00000000-1234-1234-1234-123412341234}" type="slidenum">
-              <a:rPr lang="en-US" smtClean="0"/>
-              <a:t>2</a:t>
+              <a:rPr kumimoji="0" lang="en-US" sz="1200" b="0" i="0" u="none" strike="noStrike" kern="0" cap="none" spc="0" normalizeH="0" baseline="0" noProof="0" smtClean="0">
+                <a:ln>
+                  <a:noFill/>
+                </a:ln>
+                <a:solidFill>
+                  <a:srgbClr val="A0A1A0"/>
+                </a:solidFill>
+                <a:effectLst/>
+                <a:uLnTx/>
+                <a:uFillTx/>
+                <a:latin typeface="Arial"/>
+                <a:cs typeface="Arial"/>
+                <a:sym typeface="Arial"/>
+              </a:rPr>
+              <a:pPr marL="0" marR="0" lvl="0" indent="0" algn="r" defTabSz="914400" rtl="0" eaLnBrk="1" fontAlgn="auto" latinLnBrk="0" hangingPunct="1">
+                <a:lnSpc>
+                  <a:spcPct val="100000"/>
+                </a:lnSpc>
+                <a:spcBef>
+                  <a:spcPts val="0"/>
+                </a:spcBef>
+                <a:spcAft>
+                  <a:spcPts val="0"/>
+                </a:spcAft>
+                <a:buClr>
+                  <a:srgbClr val="000000"/>
+                </a:buClr>
+                <a:buSzTx/>
+                <a:buFont typeface="Arial"/>
+                <a:buNone/>
+                <a:tabLst/>
+                <a:defRPr/>
+              </a:pPr>
+              <a:t>1</a:t>
             </a:fld>
-            <a:endParaRPr lang="en-US"/>
+            <a:endParaRPr kumimoji="0" lang="en-US" sz="1200" b="0" i="0" u="none" strike="noStrike" kern="0" cap="none" spc="0" normalizeH="0" baseline="0" noProof="0">
+              <a:ln>
+                <a:noFill/>
+              </a:ln>
+              <a:solidFill>
+                <a:srgbClr val="A0A1A0"/>
+              </a:solidFill>
+              <a:effectLst/>
+              <a:uLnTx/>
+              <a:uFillTx/>
+              <a:latin typeface="Arial"/>
+              <a:cs typeface="Arial"/>
+              <a:sym typeface="Arial"/>
+            </a:endParaRPr>
           </a:p>
         </p:txBody>
       </p:sp>
@@ -40193,8 +41614,8 @@
         </p:blipFill>
         <p:spPr>
           <a:xfrm>
-            <a:off x="514785" y="1654492"/>
-            <a:ext cx="8114430" cy="4216221"/>
+            <a:off x="166900" y="1408528"/>
+            <a:ext cx="8810200" cy="4671797"/>
           </a:xfrm>
           <a:prstGeom prst="rect">
             <a:avLst/>
@@ -40214,7 +41635,7 @@
 </p:sld>
 </file>
 
-<file path=ppt/slides/slide4.xml><?xml version="1.0" encoding="utf-8"?>
+<file path=ppt/slides/slide3.xml><?xml version="1.0" encoding="utf-8"?>
 <p:sld xmlns:a="http://schemas.openxmlformats.org/drawingml/2006/main" xmlns:r="http://schemas.openxmlformats.org/officeDocument/2006/relationships" xmlns:p="http://schemas.openxmlformats.org/presentationml/2006/main">
   <p:cSld>
     <p:spTree>
@@ -40275,10 +41696,10 @@
               <a:buNone/>
             </a:pPr>
             <a:r>
-              <a:rPr lang="en-US"/>
-              <a:t>Iterators</a:t>
+              <a:rPr lang="en-US" dirty="0"/>
+              <a:t>Collection Interface (recap)</a:t>
             </a:r>
-            <a:endParaRPr/>
+            <a:endParaRPr dirty="0"/>
           </a:p>
         </p:txBody>
       </p:sp>
@@ -40325,50 +41746,13 @@
               <a:buChar char="•"/>
             </a:pPr>
             <a:r>
-              <a:rPr lang="en-US" sz="2590"/>
-              <a:t>How do you traverse (retrieve each element in) a collection?</a:t>
+              <a:rPr lang="en-US" sz="2590" b="1" dirty="0" err="1"/>
+              <a:t>Iterable</a:t>
             </a:r>
-            <a:endParaRPr/>
-          </a:p>
-          <a:p>
-            <a:pPr marL="742950" lvl="1" indent="-285750" algn="l" rtl="0">
-              <a:lnSpc>
-                <a:spcPct val="90000"/>
-              </a:lnSpc>
-              <a:spcBef>
-                <a:spcPts val="444"/>
-              </a:spcBef>
-              <a:spcAft>
-                <a:spcPts val="0"/>
-              </a:spcAft>
-              <a:buSzPts val="2220"/>
-              <a:buChar char="–"/>
-            </a:pPr>
             <a:r>
-              <a:rPr lang="en-US" sz="2220"/>
-              <a:t>Lists: you can use the size() element to get the total number of elements, and get(int index) from 0 … size()</a:t>
+              <a:rPr lang="en-US" sz="2590" dirty="0"/>
+              <a:t> – Everything can be “iterated through”. i.e. you can look at data within these items, one by one.</a:t>
             </a:r>
-            <a:endParaRPr/>
-          </a:p>
-          <a:p>
-            <a:pPr marL="742950" lvl="1" indent="-285750" algn="l" rtl="0">
-              <a:lnSpc>
-                <a:spcPct val="90000"/>
-              </a:lnSpc>
-              <a:spcBef>
-                <a:spcPts val="444"/>
-              </a:spcBef>
-              <a:spcAft>
-                <a:spcPts val="0"/>
-              </a:spcAft>
-              <a:buSzPts val="2220"/>
-              <a:buChar char="–"/>
-            </a:pPr>
-            <a:r>
-              <a:rPr lang="en-US" sz="2220"/>
-              <a:t>Sets and Queues don’t use an index though…</a:t>
-            </a:r>
-            <a:endParaRPr/>
           </a:p>
           <a:p>
             <a:pPr marL="342900" lvl="0" indent="-342900" algn="l" rtl="0">
@@ -40376,7 +41760,7 @@
                 <a:spcPct val="90000"/>
               </a:lnSpc>
               <a:spcBef>
-                <a:spcPts val="518"/>
+                <a:spcPts val="0"/>
               </a:spcBef>
               <a:spcAft>
                 <a:spcPts val="0"/>
@@ -40385,10 +41769,13 @@
               <a:buChar char="•"/>
             </a:pPr>
             <a:r>
-              <a:rPr lang="en-US" sz="2590"/>
-              <a:t>An Iterator is an interface that specifies the behavior of blindly moving through each element in a collection</a:t>
+              <a:rPr lang="en-US" sz="2590" b="1" dirty="0"/>
+              <a:t>Collection </a:t>
             </a:r>
-            <a:endParaRPr/>
+            <a:r>
+              <a:rPr lang="en-US" sz="2590" dirty="0"/>
+              <a:t>– An Interface in Java that provides an architecture to store and manipulate objects</a:t>
+            </a:r>
           </a:p>
           <a:p>
             <a:pPr marL="342900" lvl="0" indent="-342900" algn="l" rtl="0">
@@ -40396,7 +41783,7 @@
                 <a:spcPct val="90000"/>
               </a:lnSpc>
               <a:spcBef>
-                <a:spcPts val="518"/>
+                <a:spcPts val="0"/>
               </a:spcBef>
               <a:spcAft>
                 <a:spcPts val="0"/>
@@ -40405,50 +41792,125 @@
               <a:buChar char="•"/>
             </a:pPr>
             <a:r>
-              <a:rPr lang="en-US" sz="2590"/>
-              <a:t>Calling the iterator() method of a Collection returns an Iterator object capable of unidirectional “blind” navigation</a:t>
+              <a:rPr lang="en-US" sz="2590" b="1" dirty="0"/>
+              <a:t>Set</a:t>
             </a:r>
-            <a:endParaRPr/>
+            <a:r>
+              <a:rPr lang="en-US" sz="2590" dirty="0"/>
+              <a:t> – A collection which cannot contain duplicate elements. </a:t>
+            </a:r>
           </a:p>
           <a:p>
-            <a:pPr marL="742950" lvl="1" indent="-285750" algn="l" rtl="0">
+            <a:pPr marL="800100" lvl="1" indent="-342900">
               <a:lnSpc>
                 <a:spcPct val="90000"/>
               </a:lnSpc>
               <a:spcBef>
-                <a:spcPts val="444"/>
+                <a:spcPts val="0"/>
+              </a:spcBef>
+              <a:buSzPts val="2590"/>
+              <a:buChar char="•"/>
+            </a:pPr>
+            <a:r>
+              <a:rPr lang="en-US" sz="2190" dirty="0"/>
+              <a:t>HashSet, </a:t>
+            </a:r>
+            <a:r>
+              <a:rPr lang="en-US" sz="2190" dirty="0" err="1"/>
+              <a:t>LinkedHashSet</a:t>
+            </a:r>
+            <a:r>
+              <a:rPr lang="en-US" sz="2190" dirty="0"/>
+              <a:t>, </a:t>
+            </a:r>
+            <a:r>
+              <a:rPr lang="en-US" sz="2190" dirty="0" err="1"/>
+              <a:t>SortedSet</a:t>
+            </a:r>
+            <a:endParaRPr lang="en-US" sz="2190" dirty="0"/>
+          </a:p>
+          <a:p>
+            <a:pPr marL="342900" lvl="0" indent="-342900" algn="l" rtl="0">
+              <a:lnSpc>
+                <a:spcPct val="90000"/>
+              </a:lnSpc>
+              <a:spcBef>
+                <a:spcPts val="0"/>
               </a:spcBef>
               <a:spcAft>
                 <a:spcPts val="0"/>
               </a:spcAft>
-              <a:buSzPts val="2220"/>
-              <a:buChar char="–"/>
+              <a:buSzPts val="2590"/>
+              <a:buChar char="•"/>
             </a:pPr>
             <a:r>
-              <a:rPr lang="en-US" sz="2220"/>
-              <a:t>Unidirectional: Can only move to the “next” element</a:t>
+              <a:rPr lang="en-US" sz="2590" b="1" dirty="0"/>
+              <a:t>Queue</a:t>
             </a:r>
-            <a:endParaRPr/>
+            <a:r>
+              <a:rPr lang="en-US" sz="2590" dirty="0"/>
+              <a:t> – An ordered collection of objects which utilizes a First-in-first-out principle.</a:t>
+            </a:r>
           </a:p>
           <a:p>
-            <a:pPr marL="742950" lvl="1" indent="-285750" algn="l" rtl="0">
+            <a:pPr marL="800100" lvl="1" indent="-342900">
               <a:lnSpc>
                 <a:spcPct val="90000"/>
               </a:lnSpc>
               <a:spcBef>
-                <a:spcPts val="444"/>
+                <a:spcPts val="0"/>
+              </a:spcBef>
+              <a:buSzPts val="2590"/>
+              <a:buChar char="•"/>
+            </a:pPr>
+            <a:r>
+              <a:rPr lang="en-US" sz="2190" dirty="0"/>
+              <a:t>Priority Queue, Deque</a:t>
+            </a:r>
+          </a:p>
+          <a:p>
+            <a:pPr marL="342900" lvl="0" indent="-342900" algn="l" rtl="0">
+              <a:lnSpc>
+                <a:spcPct val="90000"/>
+              </a:lnSpc>
+              <a:spcBef>
+                <a:spcPts val="0"/>
               </a:spcBef>
               <a:spcAft>
                 <a:spcPts val="0"/>
               </a:spcAft>
-              <a:buSzPts val="2220"/>
-              <a:buChar char="–"/>
+              <a:buSzPts val="2590"/>
+              <a:buChar char="•"/>
             </a:pPr>
             <a:r>
-              <a:rPr lang="en-US" sz="2220"/>
-              <a:t>Blind: no sorting is guaranteed, no telling what the “next” element is going to be</a:t>
+              <a:rPr lang="en-US" sz="2590" b="1" dirty="0"/>
+              <a:t>List</a:t>
             </a:r>
-            <a:endParaRPr/>
+            <a:r>
+              <a:rPr lang="en-US" sz="2590" dirty="0"/>
+              <a:t> – An ordered collection of objects which utilizes indexes.</a:t>
+            </a:r>
+          </a:p>
+          <a:p>
+            <a:pPr marL="800100" lvl="1" indent="-342900">
+              <a:lnSpc>
+                <a:spcPct val="90000"/>
+              </a:lnSpc>
+              <a:spcBef>
+                <a:spcPts val="0"/>
+              </a:spcBef>
+              <a:buSzPts val="2590"/>
+              <a:buChar char="•"/>
+            </a:pPr>
+            <a:r>
+              <a:rPr lang="en-US" sz="2190" dirty="0" err="1"/>
+              <a:t>ArrayList</a:t>
+            </a:r>
+            <a:r>
+              <a:rPr lang="en-US" sz="2190" dirty="0"/>
+              <a:t>, Vector, LinkedList</a:t>
+            </a:r>
+            <a:endParaRPr sz="2190" dirty="0"/>
           </a:p>
         </p:txBody>
       </p:sp>
@@ -40481,24 +41943,355 @@
           </a:bodyPr>
           <a:lstStyle/>
           <a:p>
-            <a:pPr marL="0" lvl="0" indent="0" algn="r" rtl="0">
+            <a:pPr marL="0" marR="0" lvl="0" indent="0" algn="r" defTabSz="914400" rtl="0" eaLnBrk="1" fontAlgn="auto" latinLnBrk="0" hangingPunct="1">
+              <a:lnSpc>
+                <a:spcPct val="100000"/>
+              </a:lnSpc>
               <a:spcBef>
                 <a:spcPts val="0"/>
               </a:spcBef>
               <a:spcAft>
                 <a:spcPts val="0"/>
               </a:spcAft>
+              <a:buClr>
+                <a:srgbClr val="000000"/>
+              </a:buClr>
+              <a:buSzTx/>
+              <a:buFont typeface="Arial"/>
               <a:buNone/>
+              <a:tabLst/>
+              <a:defRPr/>
             </a:pPr>
             <a:fld id="{00000000-1234-1234-1234-123412341234}" type="slidenum">
-              <a:rPr lang="en-US"/>
-              <a:t>3</a:t>
+              <a:rPr kumimoji="0" lang="en-US" sz="1200" b="0" i="0" u="none" strike="noStrike" kern="0" cap="none" spc="0" normalizeH="0" baseline="0" noProof="0">
+                <a:ln>
+                  <a:noFill/>
+                </a:ln>
+                <a:solidFill>
+                  <a:srgbClr val="A0A1A0"/>
+                </a:solidFill>
+                <a:effectLst/>
+                <a:uLnTx/>
+                <a:uFillTx/>
+                <a:latin typeface="Arial"/>
+                <a:cs typeface="Arial"/>
+                <a:sym typeface="Arial"/>
+              </a:rPr>
+              <a:pPr marL="0" marR="0" lvl="0" indent="0" algn="r" defTabSz="914400" rtl="0" eaLnBrk="1" fontAlgn="auto" latinLnBrk="0" hangingPunct="1">
+                <a:lnSpc>
+                  <a:spcPct val="100000"/>
+                </a:lnSpc>
+                <a:spcBef>
+                  <a:spcPts val="0"/>
+                </a:spcBef>
+                <a:spcAft>
+                  <a:spcPts val="0"/>
+                </a:spcAft>
+                <a:buClr>
+                  <a:srgbClr val="000000"/>
+                </a:buClr>
+                <a:buSzTx/>
+                <a:buFont typeface="Arial"/>
+                <a:buNone/>
+                <a:tabLst/>
+                <a:defRPr/>
+              </a:pPr>
+              <a:t>2</a:t>
             </a:fld>
-            <a:endParaRPr/>
+            <a:endParaRPr kumimoji="0" sz="1200" b="0" i="0" u="none" strike="noStrike" kern="0" cap="none" spc="0" normalizeH="0" baseline="0" noProof="0">
+              <a:ln>
+                <a:noFill/>
+              </a:ln>
+              <a:solidFill>
+                <a:srgbClr val="A0A1A0"/>
+              </a:solidFill>
+              <a:effectLst/>
+              <a:uLnTx/>
+              <a:uFillTx/>
+              <a:latin typeface="Arial"/>
+              <a:cs typeface="Arial"/>
+              <a:sym typeface="Arial"/>
+            </a:endParaRPr>
           </a:p>
         </p:txBody>
       </p:sp>
     </p:spTree>
+  </p:cSld>
+  <p:clrMapOvr>
+    <a:masterClrMapping/>
+  </p:clrMapOvr>
+</p:sld>
+</file>
+
+<file path=ppt/slides/slide4.xml><?xml version="1.0" encoding="utf-8"?>
+<p:sld xmlns:a="http://schemas.openxmlformats.org/drawingml/2006/main" xmlns:r="http://schemas.openxmlformats.org/officeDocument/2006/relationships" xmlns:p="http://schemas.openxmlformats.org/presentationml/2006/main">
+  <p:cSld>
+    <p:spTree>
+      <p:nvGrpSpPr>
+        <p:cNvPr id="1" name=""/>
+        <p:cNvGrpSpPr/>
+        <p:nvPr/>
+      </p:nvGrpSpPr>
+      <p:grpSpPr>
+        <a:xfrm>
+          <a:off x="0" y="0"/>
+          <a:ext cx="0" cy="0"/>
+          <a:chOff x="0" y="0"/>
+          <a:chExt cx="0" cy="0"/>
+        </a:xfrm>
+      </p:grpSpPr>
+      <p:sp>
+        <p:nvSpPr>
+          <p:cNvPr id="2" name="Title 1">
+            <a:extLst>
+              <a:ext uri="{FF2B5EF4-FFF2-40B4-BE49-F238E27FC236}">
+                <a16:creationId xmlns:a16="http://schemas.microsoft.com/office/drawing/2014/main" id="{5C2BFD3A-2FFC-4E8D-95F1-9C41F9AA8D40}"/>
+              </a:ext>
+            </a:extLst>
+          </p:cNvPr>
+          <p:cNvSpPr>
+            <a:spLocks noGrp="1"/>
+          </p:cNvSpPr>
+          <p:nvPr>
+            <p:ph type="title"/>
+          </p:nvPr>
+        </p:nvSpPr>
+        <p:spPr/>
+        <p:txBody>
+          <a:bodyPr/>
+          <a:lstStyle/>
+          <a:p>
+            <a:r>
+              <a:rPr lang="en-US" dirty="0"/>
+              <a:t>Generics</a:t>
+            </a:r>
+          </a:p>
+        </p:txBody>
+      </p:sp>
+      <p:sp>
+        <p:nvSpPr>
+          <p:cNvPr id="3" name="Text Placeholder 2">
+            <a:extLst>
+              <a:ext uri="{FF2B5EF4-FFF2-40B4-BE49-F238E27FC236}">
+                <a16:creationId xmlns:a16="http://schemas.microsoft.com/office/drawing/2014/main" id="{7B9E0700-E6D9-42C0-9F52-0CAC9EB4B9AB}"/>
+              </a:ext>
+            </a:extLst>
+          </p:cNvPr>
+          <p:cNvSpPr>
+            <a:spLocks noGrp="1"/>
+          </p:cNvSpPr>
+          <p:nvPr>
+            <p:ph type="body" idx="1"/>
+          </p:nvPr>
+        </p:nvSpPr>
+        <p:spPr>
+          <a:xfrm>
+            <a:off x="380010" y="1481446"/>
+            <a:ext cx="8383980" cy="4945987"/>
+          </a:xfrm>
+        </p:spPr>
+        <p:txBody>
+          <a:bodyPr>
+            <a:normAutofit fontScale="92500" lnSpcReduction="20000"/>
+          </a:bodyPr>
+          <a:lstStyle/>
+          <a:p>
+            <a:r>
+              <a:rPr lang="en-US" dirty="0"/>
+              <a:t>All Java Collections use “Generics”: </a:t>
+            </a:r>
+            <a:r>
+              <a:rPr lang="en-US" dirty="0">
+                <a:latin typeface="Courier New" panose="02070309020205020404" pitchFamily="49" charset="0"/>
+                <a:cs typeface="Courier New" panose="02070309020205020404" pitchFamily="49" charset="0"/>
+              </a:rPr>
+              <a:t>&lt;Type&gt;</a:t>
+            </a:r>
+          </a:p>
+          <a:p>
+            <a:r>
+              <a:rPr lang="en-US" dirty="0"/>
+              <a:t>Generics act as a specifier (and limiter) for a type of data to be used within a class or interface.</a:t>
+            </a:r>
+          </a:p>
+          <a:p>
+            <a:r>
+              <a:rPr lang="en-US" dirty="0"/>
+              <a:t>Generics can be used when writing classes, interfaces and methods*.</a:t>
+            </a:r>
+          </a:p>
+          <a:p>
+            <a:pPr lvl="1"/>
+            <a:r>
+              <a:rPr lang="en-US" dirty="0"/>
+              <a:t>*To use generics in a method, the containing class or interface must use generics</a:t>
+            </a:r>
+          </a:p>
+          <a:p>
+            <a:r>
+              <a:rPr lang="en-US" dirty="0"/>
+              <a:t>Generic types must be an object, primitives are not allowed. ‘Generic primitives’ are achieved using wrapper classes.</a:t>
+            </a:r>
+          </a:p>
+          <a:p>
+            <a:r>
+              <a:rPr lang="en-US" dirty="0"/>
+              <a:t>Generics are a way of saying, “</a:t>
+            </a:r>
+            <a:r>
+              <a:rPr lang="en-US" i="1" dirty="0"/>
+              <a:t>I don’t know what type this will be right now, but when this class is instantiated into an object, a type will be provided</a:t>
+            </a:r>
+            <a:r>
+              <a:rPr lang="en-US" dirty="0"/>
+              <a:t>”</a:t>
+            </a:r>
+          </a:p>
+          <a:p>
+            <a:r>
+              <a:rPr lang="en-US" sz="1800" dirty="0" err="1">
+                <a:latin typeface="Courier New" panose="02070309020205020404" pitchFamily="49" charset="0"/>
+                <a:cs typeface="Courier New" panose="02070309020205020404" pitchFamily="49" charset="0"/>
+              </a:rPr>
+              <a:t>ArrayList</a:t>
+            </a:r>
+            <a:r>
+              <a:rPr lang="en-US" sz="1800" dirty="0">
+                <a:latin typeface="Courier New" panose="02070309020205020404" pitchFamily="49" charset="0"/>
+                <a:cs typeface="Courier New" panose="02070309020205020404" pitchFamily="49" charset="0"/>
+              </a:rPr>
+              <a:t>&lt;String&gt; </a:t>
+            </a:r>
+            <a:r>
+              <a:rPr lang="en-US" sz="1800" dirty="0" err="1">
+                <a:latin typeface="Courier New" panose="02070309020205020404" pitchFamily="49" charset="0"/>
+                <a:cs typeface="Courier New" panose="02070309020205020404" pitchFamily="49" charset="0"/>
+              </a:rPr>
+              <a:t>strList</a:t>
+            </a:r>
+            <a:r>
+              <a:rPr lang="en-US" sz="1800" dirty="0">
+                <a:latin typeface="Courier New" panose="02070309020205020404" pitchFamily="49" charset="0"/>
+                <a:cs typeface="Courier New" panose="02070309020205020404" pitchFamily="49" charset="0"/>
+              </a:rPr>
+              <a:t> = new </a:t>
+            </a:r>
+            <a:r>
+              <a:rPr lang="en-US" sz="1800" dirty="0" err="1">
+                <a:latin typeface="Courier New" panose="02070309020205020404" pitchFamily="49" charset="0"/>
+                <a:cs typeface="Courier New" panose="02070309020205020404" pitchFamily="49" charset="0"/>
+              </a:rPr>
+              <a:t>ArrayList</a:t>
+            </a:r>
+            <a:r>
+              <a:rPr lang="en-US" sz="1800" dirty="0">
+                <a:latin typeface="Courier New" panose="02070309020205020404" pitchFamily="49" charset="0"/>
+                <a:cs typeface="Courier New" panose="02070309020205020404" pitchFamily="49" charset="0"/>
+              </a:rPr>
+              <a:t>&lt;String&gt;();</a:t>
+            </a:r>
+          </a:p>
+        </p:txBody>
+      </p:sp>
+      <p:sp>
+        <p:nvSpPr>
+          <p:cNvPr id="4" name="Slide Number Placeholder 3">
+            <a:extLst>
+              <a:ext uri="{FF2B5EF4-FFF2-40B4-BE49-F238E27FC236}">
+                <a16:creationId xmlns:a16="http://schemas.microsoft.com/office/drawing/2014/main" id="{642A279A-A0B5-4F67-94F3-EEC304C4311C}"/>
+              </a:ext>
+            </a:extLst>
+          </p:cNvPr>
+          <p:cNvSpPr>
+            <a:spLocks noGrp="1"/>
+          </p:cNvSpPr>
+          <p:nvPr>
+            <p:ph type="sldNum" idx="12"/>
+          </p:nvPr>
+        </p:nvSpPr>
+        <p:spPr/>
+        <p:txBody>
+          <a:bodyPr/>
+          <a:lstStyle/>
+          <a:p>
+            <a:pPr marL="0" marR="0" lvl="0" indent="0" algn="r" defTabSz="914400" rtl="0" eaLnBrk="1" fontAlgn="auto" latinLnBrk="0" hangingPunct="1">
+              <a:lnSpc>
+                <a:spcPct val="100000"/>
+              </a:lnSpc>
+              <a:spcBef>
+                <a:spcPts val="0"/>
+              </a:spcBef>
+              <a:spcAft>
+                <a:spcPts val="0"/>
+              </a:spcAft>
+              <a:buClr>
+                <a:srgbClr val="000000"/>
+              </a:buClr>
+              <a:buSzTx/>
+              <a:buFont typeface="Arial"/>
+              <a:buNone/>
+              <a:tabLst/>
+              <a:defRPr/>
+            </a:pPr>
+            <a:fld id="{00000000-1234-1234-1234-123412341234}" type="slidenum">
+              <a:rPr kumimoji="0" lang="en-US" sz="1200" b="0" i="0" u="none" strike="noStrike" kern="0" cap="none" spc="0" normalizeH="0" baseline="0" noProof="0" smtClean="0">
+                <a:ln>
+                  <a:noFill/>
+                </a:ln>
+                <a:solidFill>
+                  <a:srgbClr val="A0A1A0"/>
+                </a:solidFill>
+                <a:effectLst/>
+                <a:uLnTx/>
+                <a:uFillTx/>
+                <a:latin typeface="Arial"/>
+                <a:cs typeface="Arial"/>
+                <a:sym typeface="Arial"/>
+              </a:rPr>
+              <a:pPr marL="0" marR="0" lvl="0" indent="0" algn="r" defTabSz="914400" rtl="0" eaLnBrk="1" fontAlgn="auto" latinLnBrk="0" hangingPunct="1">
+                <a:lnSpc>
+                  <a:spcPct val="100000"/>
+                </a:lnSpc>
+                <a:spcBef>
+                  <a:spcPts val="0"/>
+                </a:spcBef>
+                <a:spcAft>
+                  <a:spcPts val="0"/>
+                </a:spcAft>
+                <a:buClr>
+                  <a:srgbClr val="000000"/>
+                </a:buClr>
+                <a:buSzTx/>
+                <a:buFont typeface="Arial"/>
+                <a:buNone/>
+                <a:tabLst/>
+                <a:defRPr/>
+              </a:pPr>
+              <a:t>3</a:t>
+            </a:fld>
+            <a:endParaRPr kumimoji="0" lang="en-US" sz="1200" b="0" i="0" u="none" strike="noStrike" kern="0" cap="none" spc="0" normalizeH="0" baseline="0" noProof="0">
+              <a:ln>
+                <a:noFill/>
+              </a:ln>
+              <a:solidFill>
+                <a:srgbClr val="A0A1A0"/>
+              </a:solidFill>
+              <a:effectLst/>
+              <a:uLnTx/>
+              <a:uFillTx/>
+              <a:latin typeface="Arial"/>
+              <a:cs typeface="Arial"/>
+              <a:sym typeface="Arial"/>
+            </a:endParaRPr>
+          </a:p>
+        </p:txBody>
+      </p:sp>
+    </p:spTree>
+    <p:extLst>
+      <p:ext uri="{BB962C8B-B14F-4D97-AF65-F5344CB8AC3E}">
+        <p14:creationId xmlns:p14="http://schemas.microsoft.com/office/powerpoint/2010/main" val="2678975035"/>
+      </p:ext>
+    </p:extLst>
   </p:cSld>
   <p:clrMapOvr>
     <a:masterClrMapping/>
@@ -40795,6 +42588,298 @@
 </file>
 
 <file path=ppt/slides/slide6.xml><?xml version="1.0" encoding="utf-8"?>
+<p:sld xmlns:a="http://schemas.openxmlformats.org/drawingml/2006/main" xmlns:r="http://schemas.openxmlformats.org/officeDocument/2006/relationships" xmlns:p="http://schemas.openxmlformats.org/presentationml/2006/main">
+  <p:cSld>
+    <p:spTree>
+      <p:nvGrpSpPr>
+        <p:cNvPr id="1" name="Shape 224"/>
+        <p:cNvGrpSpPr/>
+        <p:nvPr/>
+      </p:nvGrpSpPr>
+      <p:grpSpPr>
+        <a:xfrm>
+          <a:off x="0" y="0"/>
+          <a:ext cx="0" cy="0"/>
+          <a:chOff x="0" y="0"/>
+          <a:chExt cx="0" cy="0"/>
+        </a:xfrm>
+      </p:grpSpPr>
+      <p:sp>
+        <p:nvSpPr>
+          <p:cNvPr id="225" name="Google Shape;225;p17"/>
+          <p:cNvSpPr txBox="1">
+            <a:spLocks noGrp="1"/>
+          </p:cNvSpPr>
+          <p:nvPr>
+            <p:ph type="title"/>
+          </p:nvPr>
+        </p:nvSpPr>
+        <p:spPr>
+          <a:xfrm>
+            <a:off x="380010" y="-4950"/>
+            <a:ext cx="6222671" cy="1224150"/>
+          </a:xfrm>
+          <a:prstGeom prst="rect">
+            <a:avLst/>
+          </a:prstGeom>
+          <a:noFill/>
+          <a:ln>
+            <a:noFill/>
+          </a:ln>
+        </p:spPr>
+        <p:txBody>
+          <a:bodyPr spcFirstLastPara="1" wrap="square" lIns="91425" tIns="45700" rIns="91425" bIns="45700" anchor="ctr" anchorCtr="0">
+            <a:noAutofit/>
+          </a:bodyPr>
+          <a:lstStyle/>
+          <a:p>
+            <a:pPr marL="0" lvl="0" indent="0" algn="l" rtl="0">
+              <a:spcBef>
+                <a:spcPts val="0"/>
+              </a:spcBef>
+              <a:spcAft>
+                <a:spcPts val="0"/>
+              </a:spcAft>
+              <a:buClr>
+                <a:schemeClr val="lt1"/>
+              </a:buClr>
+              <a:buSzPts val="2400"/>
+              <a:buFont typeface="Arial"/>
+              <a:buNone/>
+            </a:pPr>
+            <a:r>
+              <a:rPr lang="en-US"/>
+              <a:t>Iterators</a:t>
+            </a:r>
+            <a:endParaRPr/>
+          </a:p>
+        </p:txBody>
+      </p:sp>
+      <p:sp>
+        <p:nvSpPr>
+          <p:cNvPr id="226" name="Google Shape;226;p17"/>
+          <p:cNvSpPr txBox="1">
+            <a:spLocks noGrp="1"/>
+          </p:cNvSpPr>
+          <p:nvPr>
+            <p:ph type="body" idx="1"/>
+          </p:nvPr>
+        </p:nvSpPr>
+        <p:spPr>
+          <a:xfrm>
+            <a:off x="380010" y="1481446"/>
+            <a:ext cx="8383980" cy="5111083"/>
+          </a:xfrm>
+          <a:prstGeom prst="rect">
+            <a:avLst/>
+          </a:prstGeom>
+          <a:noFill/>
+          <a:ln>
+            <a:noFill/>
+          </a:ln>
+        </p:spPr>
+        <p:txBody>
+          <a:bodyPr spcFirstLastPara="1" wrap="square" lIns="91425" tIns="45700" rIns="91425" bIns="45700" anchor="t" anchorCtr="0">
+            <a:noAutofit/>
+          </a:bodyPr>
+          <a:lstStyle/>
+          <a:p>
+            <a:pPr marL="342900" lvl="0" indent="-342900" algn="l" rtl="0">
+              <a:lnSpc>
+                <a:spcPct val="90000"/>
+              </a:lnSpc>
+              <a:spcBef>
+                <a:spcPts val="0"/>
+              </a:spcBef>
+              <a:spcAft>
+                <a:spcPts val="0"/>
+              </a:spcAft>
+              <a:buSzPts val="2590"/>
+              <a:buChar char="•"/>
+            </a:pPr>
+            <a:r>
+              <a:rPr lang="en-US" sz="2590"/>
+              <a:t>How do you traverse (retrieve each element in) a collection?</a:t>
+            </a:r>
+            <a:endParaRPr/>
+          </a:p>
+          <a:p>
+            <a:pPr marL="742950" lvl="1" indent="-285750" algn="l" rtl="0">
+              <a:lnSpc>
+                <a:spcPct val="90000"/>
+              </a:lnSpc>
+              <a:spcBef>
+                <a:spcPts val="444"/>
+              </a:spcBef>
+              <a:spcAft>
+                <a:spcPts val="0"/>
+              </a:spcAft>
+              <a:buSzPts val="2220"/>
+              <a:buChar char="–"/>
+            </a:pPr>
+            <a:r>
+              <a:rPr lang="en-US" sz="2220"/>
+              <a:t>Lists: you can use the size() element to get the total number of elements, and get(int index) from 0 … size()</a:t>
+            </a:r>
+            <a:endParaRPr/>
+          </a:p>
+          <a:p>
+            <a:pPr marL="742950" lvl="1" indent="-285750" algn="l" rtl="0">
+              <a:lnSpc>
+                <a:spcPct val="90000"/>
+              </a:lnSpc>
+              <a:spcBef>
+                <a:spcPts val="444"/>
+              </a:spcBef>
+              <a:spcAft>
+                <a:spcPts val="0"/>
+              </a:spcAft>
+              <a:buSzPts val="2220"/>
+              <a:buChar char="–"/>
+            </a:pPr>
+            <a:r>
+              <a:rPr lang="en-US" sz="2220"/>
+              <a:t>Sets and Queues don’t use an index though…</a:t>
+            </a:r>
+            <a:endParaRPr/>
+          </a:p>
+          <a:p>
+            <a:pPr marL="342900" lvl="0" indent="-342900" algn="l" rtl="0">
+              <a:lnSpc>
+                <a:spcPct val="90000"/>
+              </a:lnSpc>
+              <a:spcBef>
+                <a:spcPts val="518"/>
+              </a:spcBef>
+              <a:spcAft>
+                <a:spcPts val="0"/>
+              </a:spcAft>
+              <a:buSzPts val="2590"/>
+              <a:buChar char="•"/>
+            </a:pPr>
+            <a:r>
+              <a:rPr lang="en-US" sz="2590"/>
+              <a:t>An Iterator is an interface that specifies the behavior of blindly moving through each element in a collection</a:t>
+            </a:r>
+            <a:endParaRPr/>
+          </a:p>
+          <a:p>
+            <a:pPr marL="342900" lvl="0" indent="-342900" algn="l" rtl="0">
+              <a:lnSpc>
+                <a:spcPct val="90000"/>
+              </a:lnSpc>
+              <a:spcBef>
+                <a:spcPts val="518"/>
+              </a:spcBef>
+              <a:spcAft>
+                <a:spcPts val="0"/>
+              </a:spcAft>
+              <a:buSzPts val="2590"/>
+              <a:buChar char="•"/>
+            </a:pPr>
+            <a:r>
+              <a:rPr lang="en-US" sz="2590"/>
+              <a:t>Calling the iterator() method of a Collection returns an Iterator object capable of unidirectional “blind” navigation</a:t>
+            </a:r>
+            <a:endParaRPr/>
+          </a:p>
+          <a:p>
+            <a:pPr marL="742950" lvl="1" indent="-285750" algn="l" rtl="0">
+              <a:lnSpc>
+                <a:spcPct val="90000"/>
+              </a:lnSpc>
+              <a:spcBef>
+                <a:spcPts val="444"/>
+              </a:spcBef>
+              <a:spcAft>
+                <a:spcPts val="0"/>
+              </a:spcAft>
+              <a:buSzPts val="2220"/>
+              <a:buChar char="–"/>
+            </a:pPr>
+            <a:r>
+              <a:rPr lang="en-US" sz="2220"/>
+              <a:t>Unidirectional: Can only move to the “next” element</a:t>
+            </a:r>
+            <a:endParaRPr/>
+          </a:p>
+          <a:p>
+            <a:pPr marL="742950" lvl="1" indent="-285750" algn="l" rtl="0">
+              <a:lnSpc>
+                <a:spcPct val="90000"/>
+              </a:lnSpc>
+              <a:spcBef>
+                <a:spcPts val="444"/>
+              </a:spcBef>
+              <a:spcAft>
+                <a:spcPts val="0"/>
+              </a:spcAft>
+              <a:buSzPts val="2220"/>
+              <a:buChar char="–"/>
+            </a:pPr>
+            <a:r>
+              <a:rPr lang="en-US" sz="2220"/>
+              <a:t>Blind: no sorting is guaranteed, no telling what the “next” element is going to be</a:t>
+            </a:r>
+            <a:endParaRPr/>
+          </a:p>
+        </p:txBody>
+      </p:sp>
+      <p:sp>
+        <p:nvSpPr>
+          <p:cNvPr id="227" name="Google Shape;227;p17"/>
+          <p:cNvSpPr txBox="1">
+            <a:spLocks noGrp="1"/>
+          </p:cNvSpPr>
+          <p:nvPr>
+            <p:ph type="sldNum" idx="12"/>
+          </p:nvPr>
+        </p:nvSpPr>
+        <p:spPr>
+          <a:xfrm>
+            <a:off x="8122757" y="6363712"/>
+            <a:ext cx="861671" cy="365125"/>
+          </a:xfrm>
+          <a:prstGeom prst="rect">
+            <a:avLst/>
+          </a:prstGeom>
+          <a:noFill/>
+          <a:ln>
+            <a:noFill/>
+          </a:ln>
+        </p:spPr>
+        <p:txBody>
+          <a:bodyPr spcFirstLastPara="1" wrap="square" lIns="91425" tIns="45700" rIns="91425" bIns="45700" anchor="ctr" anchorCtr="0">
+            <a:noAutofit/>
+          </a:bodyPr>
+          <a:lstStyle/>
+          <a:p>
+            <a:pPr marL="0" lvl="0" indent="0" algn="r" rtl="0">
+              <a:spcBef>
+                <a:spcPts val="0"/>
+              </a:spcBef>
+              <a:spcAft>
+                <a:spcPts val="0"/>
+              </a:spcAft>
+              <a:buNone/>
+            </a:pPr>
+            <a:fld id="{00000000-1234-1234-1234-123412341234}" type="slidenum">
+              <a:rPr lang="en-US"/>
+              <a:t>5</a:t>
+            </a:fld>
+            <a:endParaRPr/>
+          </a:p>
+        </p:txBody>
+      </p:sp>
+    </p:spTree>
+  </p:cSld>
+  <p:clrMapOvr>
+    <a:masterClrMapping/>
+  </p:clrMapOvr>
+</p:sld>
+</file>
+
+<file path=ppt/slides/slide7.xml><?xml version="1.0" encoding="utf-8"?>
 <p:sld xmlns:a="http://schemas.openxmlformats.org/drawingml/2006/main" xmlns:r="http://schemas.openxmlformats.org/officeDocument/2006/relationships" xmlns:p="http://schemas.openxmlformats.org/presentationml/2006/main">
   <p:cSld>
     <p:spTree>
@@ -41443,261 +43528,6 @@
             </a:pPr>
             <a:fld id="{00000000-1234-1234-1234-123412341234}" type="slidenum">
               <a:rPr lang="en-US"/>
-              <a:t>5</a:t>
-            </a:fld>
-            <a:endParaRPr/>
-          </a:p>
-        </p:txBody>
-      </p:sp>
-    </p:spTree>
-  </p:cSld>
-  <p:clrMapOvr>
-    <a:masterClrMapping/>
-  </p:clrMapOvr>
-</p:sld>
-</file>
-
-<file path=ppt/slides/slide7.xml><?xml version="1.0" encoding="utf-8"?>
-<p:sld xmlns:a="http://schemas.openxmlformats.org/drawingml/2006/main" xmlns:r="http://schemas.openxmlformats.org/officeDocument/2006/relationships" xmlns:p="http://schemas.openxmlformats.org/presentationml/2006/main">
-  <p:cSld>
-    <p:spTree>
-      <p:nvGrpSpPr>
-        <p:cNvPr id="1" name="Shape 245"/>
-        <p:cNvGrpSpPr/>
-        <p:nvPr/>
-      </p:nvGrpSpPr>
-      <p:grpSpPr>
-        <a:xfrm>
-          <a:off x="0" y="0"/>
-          <a:ext cx="0" cy="0"/>
-          <a:chOff x="0" y="0"/>
-          <a:chExt cx="0" cy="0"/>
-        </a:xfrm>
-      </p:grpSpPr>
-      <p:sp>
-        <p:nvSpPr>
-          <p:cNvPr id="246" name="Google Shape;246;p20"/>
-          <p:cNvSpPr txBox="1">
-            <a:spLocks noGrp="1"/>
-          </p:cNvSpPr>
-          <p:nvPr>
-            <p:ph type="title"/>
-          </p:nvPr>
-        </p:nvSpPr>
-        <p:spPr>
-          <a:xfrm>
-            <a:off x="380010" y="-4950"/>
-            <a:ext cx="6222671" cy="1224150"/>
-          </a:xfrm>
-          <a:prstGeom prst="rect">
-            <a:avLst/>
-          </a:prstGeom>
-          <a:noFill/>
-          <a:ln>
-            <a:noFill/>
-          </a:ln>
-        </p:spPr>
-        <p:txBody>
-          <a:bodyPr spcFirstLastPara="1" wrap="square" lIns="91425" tIns="45700" rIns="91425" bIns="45700" anchor="ctr" anchorCtr="0">
-            <a:noAutofit/>
-          </a:bodyPr>
-          <a:lstStyle/>
-          <a:p>
-            <a:pPr marL="0" lvl="0" indent="0" algn="l" rtl="0">
-              <a:spcBef>
-                <a:spcPts val="0"/>
-              </a:spcBef>
-              <a:spcAft>
-                <a:spcPts val="0"/>
-              </a:spcAft>
-              <a:buClr>
-                <a:schemeClr val="lt1"/>
-              </a:buClr>
-              <a:buSzPts val="2400"/>
-              <a:buFont typeface="Arial"/>
-              <a:buNone/>
-            </a:pPr>
-            <a:r>
-              <a:rPr lang="en-US"/>
-              <a:t>Collection vs Collections</a:t>
-            </a:r>
-            <a:endParaRPr/>
-          </a:p>
-        </p:txBody>
-      </p:sp>
-      <p:sp>
-        <p:nvSpPr>
-          <p:cNvPr id="247" name="Google Shape;247;p20"/>
-          <p:cNvSpPr txBox="1">
-            <a:spLocks noGrp="1"/>
-          </p:cNvSpPr>
-          <p:nvPr>
-            <p:ph type="body" idx="1"/>
-          </p:nvPr>
-        </p:nvSpPr>
-        <p:spPr>
-          <a:xfrm>
-            <a:off x="380010" y="1481446"/>
-            <a:ext cx="8383980" cy="4525963"/>
-          </a:xfrm>
-          <a:prstGeom prst="rect">
-            <a:avLst/>
-          </a:prstGeom>
-          <a:noFill/>
-          <a:ln>
-            <a:noFill/>
-          </a:ln>
-        </p:spPr>
-        <p:txBody>
-          <a:bodyPr spcFirstLastPara="1" wrap="square" lIns="91425" tIns="45700" rIns="91425" bIns="45700" anchor="t" anchorCtr="0">
-            <a:noAutofit/>
-          </a:bodyPr>
-          <a:lstStyle/>
-          <a:p>
-            <a:pPr marL="342900" lvl="0" indent="-342900" algn="l" rtl="0">
-              <a:spcBef>
-                <a:spcPts val="0"/>
-              </a:spcBef>
-              <a:spcAft>
-                <a:spcPts val="0"/>
-              </a:spcAft>
-              <a:buSzPts val="2800"/>
-              <a:buChar char="•"/>
-            </a:pPr>
-            <a:r>
-              <a:rPr lang="en-US"/>
-              <a:t>Collection is an interface that declares mandatory behavior for collections</a:t>
-            </a:r>
-            <a:endParaRPr/>
-          </a:p>
-          <a:p>
-            <a:pPr marL="342900" lvl="0" indent="-165100" algn="l" rtl="0">
-              <a:spcBef>
-                <a:spcPts val="560"/>
-              </a:spcBef>
-              <a:spcAft>
-                <a:spcPts val="0"/>
-              </a:spcAft>
-              <a:buSzPts val="2800"/>
-              <a:buNone/>
-            </a:pPr>
-            <a:endParaRPr/>
-          </a:p>
-          <a:p>
-            <a:pPr marL="342900" lvl="0" indent="-342900" algn="l" rtl="0">
-              <a:spcBef>
-                <a:spcPts val="560"/>
-              </a:spcBef>
-              <a:spcAft>
-                <a:spcPts val="0"/>
-              </a:spcAft>
-              <a:buSzPts val="2800"/>
-              <a:buChar char="•"/>
-            </a:pPr>
-            <a:r>
-              <a:rPr lang="en-US"/>
-              <a:t>Collection</a:t>
-            </a:r>
-            <a:r>
-              <a:rPr lang="en-US" b="1" i="1" u="sng"/>
-              <a:t>s</a:t>
-            </a:r>
-            <a:r>
-              <a:rPr lang="en-US"/>
-              <a:t> is a utility class filled with static methods that can be run with Collection subclasses.</a:t>
-            </a:r>
-            <a:endParaRPr/>
-          </a:p>
-          <a:p>
-            <a:pPr marL="342900" lvl="0" indent="-165100" algn="l" rtl="0">
-              <a:spcBef>
-                <a:spcPts val="560"/>
-              </a:spcBef>
-              <a:spcAft>
-                <a:spcPts val="0"/>
-              </a:spcAft>
-              <a:buSzPts val="2800"/>
-              <a:buNone/>
-            </a:pPr>
-            <a:endParaRPr/>
-          </a:p>
-          <a:p>
-            <a:pPr marL="342900" lvl="0" indent="-342900" algn="l" rtl="0">
-              <a:spcBef>
-                <a:spcPts val="400"/>
-              </a:spcBef>
-              <a:spcAft>
-                <a:spcPts val="0"/>
-              </a:spcAft>
-              <a:buSzPts val="2000"/>
-              <a:buChar char="•"/>
-            </a:pPr>
-            <a:r>
-              <a:rPr lang="en-US" sz="2000" u="sng">
-                <a:solidFill>
-                  <a:schemeClr val="hlink"/>
-                </a:solidFill>
-                <a:hlinkClick r:id="rId3"/>
-              </a:rPr>
-              <a:t>https://docs.oracle.com/javase/8/docs/api/java/util/Collections.html</a:t>
-            </a:r>
-            <a:endParaRPr sz="2000"/>
-          </a:p>
-          <a:p>
-            <a:pPr marL="0" lvl="0" indent="0" algn="l" rtl="0">
-              <a:spcBef>
-                <a:spcPts val="400"/>
-              </a:spcBef>
-              <a:spcAft>
-                <a:spcPts val="0"/>
-              </a:spcAft>
-              <a:buSzPts val="2000"/>
-              <a:buNone/>
-            </a:pPr>
-            <a:endParaRPr sz="2000"/>
-          </a:p>
-        </p:txBody>
-      </p:sp>
-      <p:sp>
-        <p:nvSpPr>
-          <p:cNvPr id="248" name="Google Shape;248;p20"/>
-          <p:cNvSpPr txBox="1">
-            <a:spLocks noGrp="1"/>
-          </p:cNvSpPr>
-          <p:nvPr>
-            <p:ph type="sldNum" idx="12"/>
-          </p:nvPr>
-        </p:nvSpPr>
-        <p:spPr>
-          <a:xfrm>
-            <a:off x="8122757" y="6363712"/>
-            <a:ext cx="861671" cy="365125"/>
-          </a:xfrm>
-          <a:prstGeom prst="rect">
-            <a:avLst/>
-          </a:prstGeom>
-          <a:noFill/>
-          <a:ln>
-            <a:noFill/>
-          </a:ln>
-        </p:spPr>
-        <p:txBody>
-          <a:bodyPr spcFirstLastPara="1" wrap="square" lIns="91425" tIns="45700" rIns="91425" bIns="45700" anchor="ctr" anchorCtr="0">
-            <a:noAutofit/>
-          </a:bodyPr>
-          <a:lstStyle/>
-          <a:p>
-            <a:pPr marL="0" lvl="0" indent="0" algn="r" rtl="0">
-              <a:spcBef>
-                <a:spcPts val="0"/>
-              </a:spcBef>
-              <a:spcAft>
-                <a:spcPts val="0"/>
-              </a:spcAft>
-              <a:buNone/>
-            </a:pPr>
-            <a:fld id="{00000000-1234-1234-1234-123412341234}" type="slidenum">
-              <a:rPr lang="en-US"/>
               <a:t>6</a:t>
             </a:fld>
             <a:endParaRPr/>
@@ -42046,8 +43876,8 @@
         </p:blipFill>
         <p:spPr>
           <a:xfrm>
-            <a:off x="1900237" y="2662237"/>
-            <a:ext cx="5343525" cy="1533525"/>
+            <a:off x="380010" y="3670853"/>
+            <a:ext cx="8182596" cy="2348303"/>
           </a:xfrm>
           <a:prstGeom prst="rect">
             <a:avLst/>
@@ -42076,8 +43906,8 @@
         </p:blipFill>
         <p:spPr>
           <a:xfrm>
-            <a:off x="1314394" y="1530612"/>
-            <a:ext cx="1287892" cy="1188823"/>
+            <a:off x="380010" y="1343393"/>
+            <a:ext cx="1909432" cy="1762552"/>
           </a:xfrm>
           <a:prstGeom prst="rect">
             <a:avLst/>

</xml_diff>

<commit_message>
Adding Day18 Examples - MergeSort and QuickSort, with complexity notes
</commit_message>
<xml_diff>
--- a/powerpoints/Day_17.pptx
+++ b/powerpoints/Day_17.pptx
@@ -38645,10 +38645,10 @@
               <a:buChar char="•"/>
             </a:pPr>
             <a:r>
-              <a:rPr lang="en-US"/>
+              <a:rPr lang="en-US" dirty="0"/>
               <a:t>When you need to sort a collection, you need to compare two elements at a time to evaluate which comes before or after the other.</a:t>
             </a:r>
-            <a:endParaRPr/>
+            <a:endParaRPr dirty="0"/>
           </a:p>
           <a:p>
             <a:pPr marL="342900" lvl="0" indent="-342900" algn="l" rtl="0">
@@ -38665,10 +38665,10 @@
               <a:buChar char="•"/>
             </a:pPr>
             <a:r>
-              <a:rPr lang="en-US"/>
+              <a:rPr lang="en-US" dirty="0"/>
               <a:t>Java has two interfaces for this: Comparable, and Comparator</a:t>
             </a:r>
-            <a:endParaRPr/>
+            <a:endParaRPr dirty="0"/>
           </a:p>
           <a:p>
             <a:pPr marL="342900" lvl="0" indent="-342900" algn="l" rtl="0">
@@ -38685,10 +38685,10 @@
               <a:buChar char="•"/>
             </a:pPr>
             <a:r>
-              <a:rPr lang="en-US"/>
+              <a:rPr lang="en-US" dirty="0"/>
               <a:t>Comparing two objects, A and B produces an int…</a:t>
             </a:r>
-            <a:endParaRPr/>
+            <a:endParaRPr dirty="0"/>
           </a:p>
           <a:p>
             <a:pPr marL="742950" lvl="1" indent="-285750" algn="l" rtl="0">
@@ -38705,14 +38705,14 @@
               <a:buChar char="–"/>
             </a:pPr>
             <a:r>
-              <a:rPr lang="en-US"/>
+              <a:rPr lang="en-US" dirty="0"/>
               <a:t>If A comes before B, the result should be </a:t>
             </a:r>
             <a:r>
-              <a:rPr lang="en-US" i="1"/>
+              <a:rPr lang="en-US" i="1" dirty="0"/>
               <a:t>less than 0</a:t>
             </a:r>
-            <a:endParaRPr/>
+            <a:endParaRPr dirty="0"/>
           </a:p>
           <a:p>
             <a:pPr marL="742950" lvl="1" indent="-285750" algn="l" rtl="0">
@@ -38729,10 +38729,10 @@
               <a:buChar char="–"/>
             </a:pPr>
             <a:r>
-              <a:rPr lang="en-US"/>
+              <a:rPr lang="en-US" dirty="0"/>
               <a:t>If A has the same place as B, the result should be 0</a:t>
             </a:r>
-            <a:endParaRPr/>
+            <a:endParaRPr dirty="0"/>
           </a:p>
           <a:p>
             <a:pPr marL="742950" lvl="1" indent="-285750" algn="l" rtl="0">
@@ -38749,14 +38749,14 @@
               <a:buChar char="–"/>
             </a:pPr>
             <a:r>
-              <a:rPr lang="en-US"/>
+              <a:rPr lang="en-US" dirty="0"/>
               <a:t>If A comes after B, the result should be </a:t>
             </a:r>
             <a:r>
-              <a:rPr lang="en-US" i="1"/>
+              <a:rPr lang="en-US" i="1" dirty="0"/>
               <a:t>greater than 0.</a:t>
             </a:r>
-            <a:endParaRPr/>
+            <a:endParaRPr dirty="0"/>
           </a:p>
           <a:p>
             <a:pPr marL="742950" lvl="1" indent="-285750" algn="l" rtl="0">
@@ -38773,10 +38773,10 @@
               <a:buChar char="–"/>
             </a:pPr>
             <a:r>
-              <a:rPr lang="en-US"/>
+              <a:rPr lang="en-US" dirty="0"/>
               <a:t>The specific output value is never guaranteed!</a:t>
             </a:r>
-            <a:endParaRPr/>
+            <a:endParaRPr dirty="0"/>
           </a:p>
         </p:txBody>
       </p:sp>
@@ -40573,10 +40573,10 @@
               <a:buChar char="•"/>
             </a:pPr>
             <a:r>
-              <a:rPr lang="en-US"/>
+              <a:rPr lang="en-US" dirty="0"/>
               <a:t>Collection is an interface that declares mandatory behavior for collections</a:t>
             </a:r>
-            <a:endParaRPr/>
+            <a:endParaRPr dirty="0"/>
           </a:p>
           <a:p>
             <a:pPr marL="342900" lvl="0" indent="-165100" algn="l" rtl="0">
@@ -40589,7 +40589,7 @@
               <a:buSzPts val="2800"/>
               <a:buNone/>
             </a:pPr>
-            <a:endParaRPr/>
+            <a:endParaRPr dirty="0"/>
           </a:p>
           <a:p>
             <a:pPr marL="342900" lvl="0" indent="-342900" algn="l" rtl="0">
@@ -40603,18 +40603,18 @@
               <a:buChar char="•"/>
             </a:pPr>
             <a:r>
-              <a:rPr lang="en-US"/>
+              <a:rPr lang="en-US" dirty="0"/>
               <a:t>Collection</a:t>
             </a:r>
             <a:r>
-              <a:rPr lang="en-US" b="1" i="1" u="sng"/>
+              <a:rPr lang="en-US" b="1" i="1" u="sng" dirty="0"/>
               <a:t>s</a:t>
             </a:r>
             <a:r>
-              <a:rPr lang="en-US"/>
+              <a:rPr lang="en-US" dirty="0"/>
               <a:t> is a utility class filled with static methods that can be run with Collection subclasses.</a:t>
             </a:r>
-            <a:endParaRPr/>
+            <a:endParaRPr dirty="0"/>
           </a:p>
           <a:p>
             <a:pPr marL="342900" lvl="0" indent="-165100" algn="l" rtl="0">
@@ -40627,7 +40627,7 @@
               <a:buSzPts val="2800"/>
               <a:buNone/>
             </a:pPr>
-            <a:endParaRPr/>
+            <a:endParaRPr dirty="0"/>
           </a:p>
           <a:p>
             <a:pPr marL="342900" lvl="0" indent="-342900" algn="l" rtl="0">
@@ -40641,7 +40641,7 @@
               <a:buChar char="•"/>
             </a:pPr>
             <a:r>
-              <a:rPr lang="en-US" sz="2000" u="sng">
+              <a:rPr lang="en-US" sz="2000" u="sng" dirty="0">
                 <a:solidFill>
                   <a:schemeClr val="hlink"/>
                 </a:solidFill>
@@ -40649,7 +40649,7 @@
               </a:rPr>
               <a:t>https://docs.oracle.com/javase/8/docs/api/java/util/Collections.html</a:t>
             </a:r>
-            <a:endParaRPr sz="2000"/>
+            <a:endParaRPr sz="2000" dirty="0"/>
           </a:p>
           <a:p>
             <a:pPr marL="0" lvl="0" indent="0" algn="l" rtl="0">
@@ -40662,7 +40662,7 @@
               <a:buSzPts val="2000"/>
               <a:buNone/>
             </a:pPr>
-            <a:endParaRPr sz="2000"/>
+            <a:endParaRPr sz="2000" dirty="0"/>
           </a:p>
         </p:txBody>
       </p:sp>
@@ -40829,15 +40829,7 @@
             </a:pPr>
             <a:r>
               <a:rPr lang="en-US" dirty="0"/>
-              <a:t>Some of these static methods </a:t>
-            </a:r>
-            <a:r>
-              <a:rPr lang="en-US" dirty="0" err="1"/>
-              <a:t>inlcude</a:t>
-            </a:r>
-            <a:r>
-              <a:rPr lang="en-US" dirty="0"/>
-              <a:t>:</a:t>
+              <a:t>Some of these static methods include:</a:t>
             </a:r>
           </a:p>
           <a:p>
@@ -42648,10 +42640,10 @@
               <a:buNone/>
             </a:pPr>
             <a:r>
-              <a:rPr lang="en-US"/>
+              <a:rPr lang="en-US" dirty="0"/>
               <a:t>Iterators</a:t>
             </a:r>
-            <a:endParaRPr/>
+            <a:endParaRPr dirty="0"/>
           </a:p>
         </p:txBody>
       </p:sp>
@@ -43603,10 +43595,10 @@
               <a:buNone/>
             </a:pPr>
             <a:r>
-              <a:rPr lang="en-US"/>
+              <a:rPr lang="en-US" dirty="0"/>
               <a:t>Java Maps</a:t>
             </a:r>
-            <a:endParaRPr/>
+            <a:endParaRPr dirty="0"/>
           </a:p>
         </p:txBody>
       </p:sp>

</xml_diff>